<commit_message>
Updated the Powerpoint with analysis instructions.
</commit_message>
<xml_diff>
--- a/Instructions_IV_SHH_measurement.pptx
+++ b/Instructions_IV_SHH_measurement.pptx
@@ -3470,156 +3470,141 @@
           <a:chExt cx="0" cy="0"/>
         </a:xfrm>
       </p:grpSpPr>
-      <p:grpSp>
-        <p:nvGrpSpPr>
-          <p:cNvPr id="6" name="Group 5"/>
-          <p:cNvGrpSpPr/>
+      <p:sp>
+        <p:nvSpPr>
+          <p:cNvPr id="2" name="TextBox 1"/>
+          <p:cNvSpPr txBox="1"/>
           <p:nvPr/>
-        </p:nvGrpSpPr>
-        <p:grpSpPr>
+        </p:nvSpPr>
+        <p:spPr>
           <a:xfrm>
-            <a:off x="227263" y="3031131"/>
-            <a:ext cx="4398264" cy="1348966"/>
-            <a:chOff x="2747289" y="137614"/>
-            <a:chExt cx="4398264" cy="1348966"/>
+            <a:off x="1755662" y="4593106"/>
+            <a:ext cx="1769587" cy="369332"/>
           </a:xfrm>
-        </p:grpSpPr>
-        <p:sp>
-          <p:nvSpPr>
-            <p:cNvPr id="2" name="TextBox 1"/>
-            <p:cNvSpPr txBox="1"/>
-            <p:nvPr/>
-          </p:nvSpPr>
-          <p:spPr>
-            <a:xfrm>
-              <a:off x="4142901" y="137614"/>
-              <a:ext cx="1769587" cy="369332"/>
-            </a:xfrm>
-            <a:prstGeom prst="rect">
-              <a:avLst/>
-            </a:prstGeom>
-            <a:noFill/>
-          </p:spPr>
-          <p:txBody>
-            <a:bodyPr wrap="none" rtlCol="0">
-              <a:spAutoFit/>
-            </a:bodyPr>
-            <a:lstStyle/>
-            <a:p>
-              <a:r>
-                <a:rPr lang="en-US" dirty="0" smtClean="0"/>
-                <a:t>Run the Program</a:t>
-              </a:r>
-              <a:endParaRPr lang="en-US" dirty="0"/>
-            </a:p>
-          </p:txBody>
-        </p:sp>
-        <p:sp>
-          <p:nvSpPr>
-            <p:cNvPr id="3" name="TextBox 2"/>
-            <p:cNvSpPr txBox="1"/>
-            <p:nvPr/>
-          </p:nvSpPr>
-          <p:spPr>
-            <a:xfrm>
-              <a:off x="2844436" y="506946"/>
-              <a:ext cx="4203971" cy="307777"/>
-            </a:xfrm>
-            <a:prstGeom prst="rect">
-              <a:avLst/>
-            </a:prstGeom>
-            <a:noFill/>
-          </p:spPr>
-          <p:txBody>
-            <a:bodyPr wrap="none" rtlCol="0">
-              <a:spAutoFit/>
-            </a:bodyPr>
-            <a:lstStyle/>
-            <a:p>
-              <a:r>
-                <a:rPr lang="en-US" sz="1400" dirty="0" smtClean="0"/>
-                <a:t>C:\Users\maglab\Documents\qdppms&gt;py IV_sweep.py</a:t>
-              </a:r>
-            </a:p>
-          </p:txBody>
-        </p:sp>
-        <p:sp>
-          <p:nvSpPr>
-            <p:cNvPr id="4" name="TextBox 3"/>
-            <p:cNvSpPr txBox="1"/>
-            <p:nvPr/>
-          </p:nvSpPr>
-          <p:spPr>
-            <a:xfrm>
-              <a:off x="3547873" y="814723"/>
-              <a:ext cx="3319271" cy="523220"/>
-            </a:xfrm>
-            <a:prstGeom prst="rect">
-              <a:avLst/>
-            </a:prstGeom>
-            <a:noFill/>
-          </p:spPr>
-          <p:txBody>
-            <a:bodyPr wrap="square" rtlCol="0">
-              <a:spAutoFit/>
-            </a:bodyPr>
-            <a:lstStyle/>
-            <a:p>
-              <a:r>
-                <a:rPr lang="en-US" sz="1400" dirty="0" smtClean="0"/>
-                <a:t>Navigate to the directory, then to run only type with is AFTER the “&gt;”.</a:t>
-              </a:r>
-              <a:endParaRPr lang="en-US" sz="1400" dirty="0"/>
-            </a:p>
-          </p:txBody>
-        </p:sp>
-        <p:sp>
-          <p:nvSpPr>
-            <p:cNvPr id="5" name="Rectangle 4"/>
-            <p:cNvSpPr/>
-            <p:nvPr/>
-          </p:nvSpPr>
-          <p:spPr>
-            <a:xfrm>
-              <a:off x="2747289" y="142866"/>
-              <a:ext cx="4398264" cy="1343714"/>
-            </a:xfrm>
-            <a:prstGeom prst="rect">
-              <a:avLst/>
-            </a:prstGeom>
-            <a:noFill/>
-            <a:ln w="19050">
-              <a:solidFill>
-                <a:schemeClr val="tx1"/>
-              </a:solidFill>
-            </a:ln>
-          </p:spPr>
-          <p:style>
-            <a:lnRef idx="2">
-              <a:schemeClr val="accent1">
-                <a:shade val="50000"/>
-              </a:schemeClr>
-            </a:lnRef>
-            <a:fillRef idx="1">
-              <a:schemeClr val="accent1"/>
-            </a:fillRef>
-            <a:effectRef idx="0">
-              <a:schemeClr val="accent1"/>
-            </a:effectRef>
-            <a:fontRef idx="minor">
-              <a:schemeClr val="lt1"/>
-            </a:fontRef>
-          </p:style>
-          <p:txBody>
-            <a:bodyPr rtlCol="0" anchor="ctr"/>
-            <a:lstStyle/>
-            <a:p>
-              <a:pPr algn="ctr"/>
-              <a:endParaRPr lang="en-US"/>
-            </a:p>
-          </p:txBody>
-        </p:sp>
-      </p:grpSp>
+          <a:prstGeom prst="rect">
+            <a:avLst/>
+          </a:prstGeom>
+          <a:noFill/>
+        </p:spPr>
+        <p:txBody>
+          <a:bodyPr wrap="none" rtlCol="0">
+            <a:spAutoFit/>
+          </a:bodyPr>
+          <a:lstStyle/>
+          <a:p>
+            <a:r>
+              <a:rPr lang="en-US" dirty="0" smtClean="0"/>
+              <a:t>Run the Program</a:t>
+            </a:r>
+            <a:endParaRPr lang="en-US" dirty="0"/>
+          </a:p>
+        </p:txBody>
+      </p:sp>
+      <p:sp>
+        <p:nvSpPr>
+          <p:cNvPr id="3" name="TextBox 2"/>
+          <p:cNvSpPr txBox="1"/>
+          <p:nvPr/>
+        </p:nvSpPr>
+        <p:spPr>
+          <a:xfrm>
+            <a:off x="296541" y="5958008"/>
+            <a:ext cx="4549515" cy="307777"/>
+          </a:xfrm>
+          <a:prstGeom prst="rect">
+            <a:avLst/>
+          </a:prstGeom>
+          <a:noFill/>
+        </p:spPr>
+        <p:txBody>
+          <a:bodyPr wrap="none" rtlCol="0">
+            <a:spAutoFit/>
+          </a:bodyPr>
+          <a:lstStyle/>
+          <a:p>
+            <a:r>
+              <a:rPr lang="en-US" sz="1400" dirty="0" smtClean="0"/>
+              <a:t>C:\Users\maglab\Documents\qdppms&gt;python IV_sweep.py</a:t>
+            </a:r>
+          </a:p>
+        </p:txBody>
+      </p:sp>
+      <p:sp>
+        <p:nvSpPr>
+          <p:cNvPr id="4" name="TextBox 3"/>
+          <p:cNvSpPr txBox="1"/>
+          <p:nvPr/>
+        </p:nvSpPr>
+        <p:spPr>
+          <a:xfrm>
+            <a:off x="1127591" y="6219618"/>
+            <a:ext cx="3319271" cy="523220"/>
+          </a:xfrm>
+          <a:prstGeom prst="rect">
+            <a:avLst/>
+          </a:prstGeom>
+          <a:noFill/>
+        </p:spPr>
+        <p:txBody>
+          <a:bodyPr wrap="square" rtlCol="0">
+            <a:spAutoFit/>
+          </a:bodyPr>
+          <a:lstStyle/>
+          <a:p>
+            <a:r>
+              <a:rPr lang="en-US" sz="1400" dirty="0" smtClean="0"/>
+              <a:t>Navigate to the directory, then to run only type with is AFTER the “&gt;”.</a:t>
+            </a:r>
+            <a:endParaRPr lang="en-US" sz="1400" dirty="0"/>
+          </a:p>
+        </p:txBody>
+      </p:sp>
+      <p:sp>
+        <p:nvSpPr>
+          <p:cNvPr id="5" name="Rectangle 4"/>
+          <p:cNvSpPr/>
+          <p:nvPr/>
+        </p:nvSpPr>
+        <p:spPr>
+          <a:xfrm>
+            <a:off x="129906" y="4611129"/>
+            <a:ext cx="5194720" cy="2142096"/>
+          </a:xfrm>
+          <a:prstGeom prst="rect">
+            <a:avLst/>
+          </a:prstGeom>
+          <a:noFill/>
+          <a:ln w="19050">
+            <a:solidFill>
+              <a:schemeClr val="tx1"/>
+            </a:solidFill>
+          </a:ln>
+        </p:spPr>
+        <p:style>
+          <a:lnRef idx="2">
+            <a:schemeClr val="accent1">
+              <a:shade val="50000"/>
+            </a:schemeClr>
+          </a:lnRef>
+          <a:fillRef idx="1">
+            <a:schemeClr val="accent1"/>
+          </a:fillRef>
+          <a:effectRef idx="0">
+            <a:schemeClr val="accent1"/>
+          </a:effectRef>
+          <a:fontRef idx="minor">
+            <a:schemeClr val="lt1"/>
+          </a:fontRef>
+        </p:style>
+        <p:txBody>
+          <a:bodyPr rtlCol="0" anchor="ctr"/>
+          <a:lstStyle/>
+          <a:p>
+            <a:pPr algn="ctr"/>
+            <a:endParaRPr lang="en-US"/>
+          </a:p>
+        </p:txBody>
+      </p:sp>
       <p:grpSp>
         <p:nvGrpSpPr>
           <p:cNvPr id="27" name="Group 26"/>
@@ -3628,7 +3613,7 @@
         </p:nvGrpSpPr>
         <p:grpSpPr>
           <a:xfrm>
-            <a:off x="167538" y="833894"/>
+            <a:off x="143403" y="2575321"/>
             <a:ext cx="5204782" cy="1942796"/>
             <a:chOff x="167538" y="833894"/>
             <a:chExt cx="5204782" cy="1942796"/>
@@ -4087,7 +4072,7 @@
         </p:nvGrpSpPr>
         <p:grpSpPr>
           <a:xfrm>
-            <a:off x="5505325" y="120056"/>
+            <a:off x="5488378" y="832890"/>
             <a:ext cx="3711311" cy="5413969"/>
             <a:chOff x="5505325" y="120056"/>
             <a:chExt cx="3711311" cy="5413969"/>
@@ -4302,16 +4287,146 @@
           </p:sp>
         </p:grpSp>
       </p:grpSp>
-      <p:sp>
-        <p:nvSpPr>
-          <p:cNvPr id="31" name="TextBox 30"/>
+      <p:grpSp>
+        <p:nvGrpSpPr>
+          <p:cNvPr id="33" name="Group 32"/>
+          <p:cNvGrpSpPr/>
+          <p:nvPr/>
+        </p:nvGrpSpPr>
+        <p:grpSpPr>
+          <a:xfrm>
+            <a:off x="129906" y="845241"/>
+            <a:ext cx="5309490" cy="1677148"/>
+            <a:chOff x="154416" y="4687873"/>
+            <a:chExt cx="5309490" cy="1677148"/>
+          </a:xfrm>
+        </p:grpSpPr>
+        <p:sp>
+          <p:nvSpPr>
+            <p:cNvPr id="31" name="TextBox 30"/>
+            <p:cNvSpPr txBox="1"/>
+            <p:nvPr/>
+          </p:nvSpPr>
+          <p:spPr>
+            <a:xfrm>
+              <a:off x="159568" y="4703028"/>
+              <a:ext cx="5304338" cy="1661993"/>
+            </a:xfrm>
+            <a:prstGeom prst="rect">
+              <a:avLst/>
+            </a:prstGeom>
+            <a:noFill/>
+          </p:spPr>
+          <p:txBody>
+            <a:bodyPr wrap="square" rtlCol="0">
+              <a:spAutoFit/>
+            </a:bodyPr>
+            <a:lstStyle/>
+            <a:p>
+              <a:pPr algn="ctr"/>
+              <a:r>
+                <a:rPr lang="en-US" dirty="0" smtClean="0"/>
+                <a:t>High-Level Science Needs</a:t>
+              </a:r>
+            </a:p>
+            <a:p>
+              <a:pPr marL="285750" indent="-285750">
+                <a:buFont typeface="Arial" panose="020B0604020202020204" pitchFamily="34" charset="0"/>
+                <a:buChar char="•"/>
+              </a:pPr>
+              <a:r>
+                <a:rPr lang="en-US" sz="1400" dirty="0" smtClean="0"/>
+                <a:t>One measurement will be at a fixed temp and H direction, changing H magnitude.</a:t>
+              </a:r>
+              <a:endParaRPr lang="en-US" sz="1400" dirty="0" smtClean="0"/>
+            </a:p>
+            <a:p>
+              <a:pPr marL="285750" indent="-285750">
+                <a:buFont typeface="Arial" panose="020B0604020202020204" pitchFamily="34" charset="0"/>
+                <a:buChar char="•"/>
+              </a:pPr>
+              <a:r>
+                <a:rPr lang="en-US" sz="1400" dirty="0" smtClean="0"/>
+                <a:t>Both out-of-plane and in-plane (H || I) field orientations.</a:t>
+              </a:r>
+            </a:p>
+            <a:p>
+              <a:pPr marL="285750" indent="-285750">
+                <a:buFont typeface="Arial" panose="020B0604020202020204" pitchFamily="34" charset="0"/>
+                <a:buChar char="•"/>
+              </a:pPr>
+              <a:r>
+                <a:rPr lang="en-US" sz="1400" dirty="0" smtClean="0"/>
+                <a:t>Perform a quick field sweep to determine the </a:t>
+              </a:r>
+              <a:r>
+                <a:rPr lang="en-US" sz="1400" dirty="0" err="1" smtClean="0"/>
+                <a:t>coercivity</a:t>
+              </a:r>
+              <a:r>
+                <a:rPr lang="en-US" sz="1400" dirty="0" smtClean="0"/>
+                <a:t> of the magnet and make sure the field measurement occurs in the high-field limit.</a:t>
+              </a:r>
+            </a:p>
+          </p:txBody>
+        </p:sp>
+        <p:sp>
+          <p:nvSpPr>
+            <p:cNvPr id="32" name="Rectangle 31"/>
+            <p:cNvSpPr/>
+            <p:nvPr/>
+          </p:nvSpPr>
+          <p:spPr>
+            <a:xfrm>
+              <a:off x="154416" y="4687873"/>
+              <a:ext cx="5194721" cy="1677147"/>
+            </a:xfrm>
+            <a:prstGeom prst="rect">
+              <a:avLst/>
+            </a:prstGeom>
+            <a:noFill/>
+            <a:ln w="19050">
+              <a:solidFill>
+                <a:schemeClr val="tx1"/>
+              </a:solidFill>
+            </a:ln>
+          </p:spPr>
+          <p:style>
+            <a:lnRef idx="2">
+              <a:schemeClr val="accent1">
+                <a:shade val="50000"/>
+              </a:schemeClr>
+            </a:lnRef>
+            <a:fillRef idx="1">
+              <a:schemeClr val="accent1"/>
+            </a:fillRef>
+            <a:effectRef idx="0">
+              <a:schemeClr val="accent1"/>
+            </a:effectRef>
+            <a:fontRef idx="minor">
+              <a:schemeClr val="lt1"/>
+            </a:fontRef>
+          </p:style>
+          <p:txBody>
+            <a:bodyPr rtlCol="0" anchor="ctr"/>
+            <a:lstStyle/>
+            <a:p>
+              <a:pPr algn="ctr"/>
+              <a:endParaRPr lang="en-US"/>
+            </a:p>
+          </p:txBody>
+        </p:sp>
+      </p:grpSp>
+      <p:sp>
+        <p:nvSpPr>
+          <p:cNvPr id="34" name="TextBox 33"/>
           <p:cNvSpPr txBox="1"/>
           <p:nvPr/>
         </p:nvSpPr>
         <p:spPr>
           <a:xfrm>
-            <a:off x="159568" y="4703028"/>
-            <a:ext cx="5304338" cy="1661993"/>
+            <a:off x="314402" y="4881966"/>
+            <a:ext cx="4818664" cy="523220"/>
           </a:xfrm>
           <a:prstGeom prst="rect">
             <a:avLst/>
@@ -4324,99 +4439,295 @@
           </a:bodyPr>
           <a:lstStyle/>
           <a:p>
-            <a:pPr algn="ctr"/>
-            <a:r>
-              <a:rPr lang="en-US" dirty="0" smtClean="0"/>
-              <a:t>High-Level Science Needs</a:t>
-            </a:r>
-          </a:p>
-          <a:p>
-            <a:pPr marL="285750" indent="-285750">
-              <a:buFont typeface="Arial" panose="020B0604020202020204" pitchFamily="34" charset="0"/>
-              <a:buChar char="•"/>
-            </a:pPr>
             <a:r>
               <a:rPr lang="en-US" sz="1400" dirty="0" smtClean="0"/>
-              <a:t>One measurement will be at a fixed temp and H direction, changing H magnitude.</a:t>
-            </a:r>
-            <a:endParaRPr lang="en-US" sz="1400" dirty="0" smtClean="0"/>
-          </a:p>
-          <a:p>
-            <a:pPr marL="285750" indent="-285750">
-              <a:buFont typeface="Arial" panose="020B0604020202020204" pitchFamily="34" charset="0"/>
-              <a:buChar char="•"/>
-            </a:pPr>
+              <a:t>Make sure socket server is running on PPMS </a:t>
+            </a:r>
+            <a:r>
+              <a:rPr lang="en-US" sz="1400" dirty="0" err="1" smtClean="0"/>
+              <a:t>MultiVu</a:t>
+            </a:r>
             <a:r>
               <a:rPr lang="en-US" sz="1400" dirty="0" smtClean="0"/>
-              <a:t>Both out-of-plane and in-plane (H || I) field orientations.</a:t>
-            </a:r>
-          </a:p>
-          <a:p>
-            <a:pPr marL="285750" indent="-285750">
-              <a:buFont typeface="Arial" panose="020B0604020202020204" pitchFamily="34" charset="0"/>
-              <a:buChar char="•"/>
-            </a:pPr>
-            <a:r>
-              <a:rPr lang="en-US" sz="1400" dirty="0" smtClean="0"/>
-              <a:t>Perform a quick field sweep to determine the </a:t>
-            </a:r>
-            <a:r>
-              <a:rPr lang="en-US" sz="1400" dirty="0" err="1" smtClean="0"/>
-              <a:t>coercivity</a:t>
-            </a:r>
-            <a:r>
-              <a:rPr lang="en-US" sz="1400" dirty="0" smtClean="0"/>
-              <a:t> of the magnet and make sure the field measurement occurs in the high-field limit.</a:t>
-            </a:r>
-          </a:p>
-        </p:txBody>
-      </p:sp>
-      <p:sp>
-        <p:nvSpPr>
-          <p:cNvPr id="32" name="Rectangle 31"/>
-          <p:cNvSpPr/>
+              <a:t> computer. If not:</a:t>
+            </a:r>
+            <a:endParaRPr lang="en-US" sz="1400" dirty="0"/>
+          </a:p>
+        </p:txBody>
+      </p:sp>
+      <p:sp>
+        <p:nvSpPr>
+          <p:cNvPr id="35" name="TextBox 34"/>
+          <p:cNvSpPr txBox="1"/>
           <p:nvPr/>
         </p:nvSpPr>
         <p:spPr>
           <a:xfrm>
-            <a:off x="154416" y="4687873"/>
-            <a:ext cx="5194721" cy="1677147"/>
+            <a:off x="308028" y="5289182"/>
+            <a:ext cx="4852350" cy="523220"/>
           </a:xfrm>
           <a:prstGeom prst="rect">
             <a:avLst/>
           </a:prstGeom>
           <a:noFill/>
+        </p:spPr>
+        <p:txBody>
+          <a:bodyPr wrap="square" rtlCol="0">
+            <a:spAutoFit/>
+          </a:bodyPr>
+          <a:lstStyle/>
+          <a:p>
+            <a:r>
+              <a:rPr lang="en-US" sz="1400" dirty="0" smtClean="0"/>
+              <a:t>C:\Users\QDUser\Documents\python\00.02.01&gt;python qd_socket_server.py DYNACOOL –</a:t>
+            </a:r>
+            <a:r>
+              <a:rPr lang="en-US" sz="1400" dirty="0" err="1" smtClean="0"/>
+              <a:t>ip</a:t>
+            </a:r>
+            <a:r>
+              <a:rPr lang="en-US" sz="1400" dirty="0" smtClean="0"/>
+              <a:t>=128.104.184.130</a:t>
+            </a:r>
+          </a:p>
+        </p:txBody>
+      </p:sp>
+      <p:sp>
+        <p:nvSpPr>
+          <p:cNvPr id="36" name="TextBox 35"/>
+          <p:cNvSpPr txBox="1"/>
+          <p:nvPr/>
+        </p:nvSpPr>
+        <p:spPr>
+          <a:xfrm>
+            <a:off x="296541" y="5752068"/>
+            <a:ext cx="2845010" cy="307777"/>
+          </a:xfrm>
+          <a:prstGeom prst="rect">
+            <a:avLst/>
+          </a:prstGeom>
+          <a:noFill/>
+        </p:spPr>
+        <p:txBody>
+          <a:bodyPr wrap="none" rtlCol="0">
+            <a:spAutoFit/>
+          </a:bodyPr>
+          <a:lstStyle/>
+          <a:p>
+            <a:r>
+              <a:rPr lang="en-US" sz="1400" dirty="0" smtClean="0"/>
+              <a:t>To run a measurement (on cart </a:t>
+            </a:r>
+            <a:r>
+              <a:rPr lang="en-US" sz="1400" dirty="0" err="1" smtClean="0"/>
+              <a:t>cpu</a:t>
+            </a:r>
+            <a:r>
+              <a:rPr lang="en-US" sz="1400" dirty="0" smtClean="0"/>
+              <a:t>):</a:t>
+            </a:r>
+            <a:endParaRPr lang="en-US" sz="1400" dirty="0"/>
+          </a:p>
+        </p:txBody>
+      </p:sp>
+      <p:cxnSp>
+        <p:nvCxnSpPr>
+          <p:cNvPr id="38" name="Straight Connector 37"/>
+          <p:cNvCxnSpPr/>
+          <p:nvPr/>
+        </p:nvCxnSpPr>
+        <p:spPr>
+          <a:xfrm>
+            <a:off x="129906" y="5786952"/>
+            <a:ext cx="5194720" cy="0"/>
+          </a:xfrm>
+          <a:prstGeom prst="line">
+            <a:avLst/>
+          </a:prstGeom>
           <a:ln w="19050">
             <a:solidFill>
-              <a:schemeClr val="tx1"/>
+              <a:schemeClr val="bg2">
+                <a:lumMod val="50000"/>
+              </a:schemeClr>
             </a:solidFill>
+            <a:prstDash val="sysDash"/>
           </a:ln>
         </p:spPr>
         <p:style>
-          <a:lnRef idx="2">
-            <a:schemeClr val="accent1">
-              <a:shade val="50000"/>
-            </a:schemeClr>
+          <a:lnRef idx="1">
+            <a:schemeClr val="accent1"/>
           </a:lnRef>
-          <a:fillRef idx="1">
+          <a:fillRef idx="0">
             <a:schemeClr val="accent1"/>
           </a:fillRef>
           <a:effectRef idx="0">
             <a:schemeClr val="accent1"/>
           </a:effectRef>
           <a:fontRef idx="minor">
-            <a:schemeClr val="lt1"/>
+            <a:schemeClr val="tx1"/>
           </a:fontRef>
         </p:style>
-        <p:txBody>
-          <a:bodyPr rtlCol="0" anchor="ctr"/>
-          <a:lstStyle/>
-          <a:p>
-            <a:pPr algn="ctr"/>
-            <a:endParaRPr lang="en-US"/>
-          </a:p>
-        </p:txBody>
-      </p:sp>
+      </p:cxnSp>
+      <p:cxnSp>
+        <p:nvCxnSpPr>
+          <p:cNvPr id="39" name="Straight Connector 38"/>
+          <p:cNvCxnSpPr/>
+          <p:nvPr/>
+        </p:nvCxnSpPr>
+        <p:spPr>
+          <a:xfrm>
+            <a:off x="129906" y="6244152"/>
+            <a:ext cx="5194720" cy="0"/>
+          </a:xfrm>
+          <a:prstGeom prst="line">
+            <a:avLst/>
+          </a:prstGeom>
+          <a:ln w="19050">
+            <a:solidFill>
+              <a:schemeClr val="bg2">
+                <a:lumMod val="50000"/>
+              </a:schemeClr>
+            </a:solidFill>
+            <a:prstDash val="sysDash"/>
+          </a:ln>
+        </p:spPr>
+        <p:style>
+          <a:lnRef idx="1">
+            <a:schemeClr val="accent1"/>
+          </a:lnRef>
+          <a:fillRef idx="0">
+            <a:schemeClr val="accent1"/>
+          </a:fillRef>
+          <a:effectRef idx="0">
+            <a:schemeClr val="accent1"/>
+          </a:effectRef>
+          <a:fontRef idx="minor">
+            <a:schemeClr val="tx1"/>
+          </a:fontRef>
+        </p:style>
+      </p:cxnSp>
+      <p:grpSp>
+        <p:nvGrpSpPr>
+          <p:cNvPr id="42" name="Group 41"/>
+          <p:cNvGrpSpPr/>
+          <p:nvPr/>
+        </p:nvGrpSpPr>
+        <p:grpSpPr>
+          <a:xfrm>
+            <a:off x="9315192" y="832890"/>
+            <a:ext cx="2626872" cy="3640145"/>
+            <a:chOff x="9315192" y="832890"/>
+            <a:chExt cx="2626872" cy="3640145"/>
+          </a:xfrm>
+        </p:grpSpPr>
+        <p:sp>
+          <p:nvSpPr>
+            <p:cNvPr id="40" name="TextBox 39"/>
+            <p:cNvSpPr txBox="1"/>
+            <p:nvPr/>
+          </p:nvSpPr>
+          <p:spPr>
+            <a:xfrm>
+              <a:off x="9340473" y="872049"/>
+              <a:ext cx="2601591" cy="3600986"/>
+            </a:xfrm>
+            <a:prstGeom prst="rect">
+              <a:avLst/>
+            </a:prstGeom>
+            <a:noFill/>
+          </p:spPr>
+          <p:txBody>
+            <a:bodyPr wrap="square" rtlCol="0">
+              <a:spAutoFit/>
+            </a:bodyPr>
+            <a:lstStyle/>
+            <a:p>
+              <a:pPr algn="ctr"/>
+              <a:r>
+                <a:rPr lang="en-US" dirty="0" smtClean="0"/>
+                <a:t>Analysis</a:t>
+              </a:r>
+            </a:p>
+            <a:p>
+              <a:pPr marL="342900" indent="-342900">
+                <a:buFont typeface="+mj-lt"/>
+                <a:buAutoNum type="arabicPeriod"/>
+              </a:pPr>
+              <a:r>
+                <a:rPr lang="en-US" sz="1400" dirty="0" smtClean="0"/>
+                <a:t>Copy the field_vals.txt file from another directory into the directory with your data, and modify it with your actual field values.</a:t>
+              </a:r>
+            </a:p>
+            <a:p>
+              <a:pPr marL="342900" indent="-342900">
+                <a:buFont typeface="+mj-lt"/>
+                <a:buAutoNum type="arabicPeriod"/>
+              </a:pPr>
+              <a:r>
+                <a:rPr lang="en-US" sz="1400" dirty="0" smtClean="0"/>
+                <a:t>Run IV_sweep_quickplot.py from the analysis directory, modified in main() to read from your directory, and write the summary file name your prefer.</a:t>
+              </a:r>
+            </a:p>
+            <a:p>
+              <a:pPr marL="342900" indent="-342900">
+                <a:buFont typeface="+mj-lt"/>
+                <a:buAutoNum type="arabicPeriod"/>
+              </a:pPr>
+              <a:r>
+                <a:rPr lang="en-US" sz="1400" dirty="0" smtClean="0"/>
+                <a:t>Use your software of choice to plot and fit the data and correct for spurious contributions.</a:t>
+              </a:r>
+              <a:endParaRPr lang="en-US" sz="1400" dirty="0"/>
+            </a:p>
+          </p:txBody>
+        </p:sp>
+        <p:sp>
+          <p:nvSpPr>
+            <p:cNvPr id="41" name="Rectangle 40"/>
+            <p:cNvSpPr/>
+            <p:nvPr/>
+          </p:nvSpPr>
+          <p:spPr>
+            <a:xfrm>
+              <a:off x="9315192" y="832890"/>
+              <a:ext cx="2626872" cy="3640145"/>
+            </a:xfrm>
+            <a:prstGeom prst="rect">
+              <a:avLst/>
+            </a:prstGeom>
+            <a:noFill/>
+            <a:ln w="19050">
+              <a:solidFill>
+                <a:schemeClr val="tx1"/>
+              </a:solidFill>
+            </a:ln>
+          </p:spPr>
+          <p:style>
+            <a:lnRef idx="2">
+              <a:schemeClr val="accent1">
+                <a:shade val="50000"/>
+              </a:schemeClr>
+            </a:lnRef>
+            <a:fillRef idx="1">
+              <a:schemeClr val="accent1"/>
+            </a:fillRef>
+            <a:effectRef idx="0">
+              <a:schemeClr val="accent1"/>
+            </a:effectRef>
+            <a:fontRef idx="minor">
+              <a:schemeClr val="lt1"/>
+            </a:fontRef>
+          </p:style>
+          <p:txBody>
+            <a:bodyPr rtlCol="0" anchor="ctr"/>
+            <a:lstStyle/>
+            <a:p>
+              <a:pPr algn="ctr"/>
+              <a:endParaRPr lang="en-US"/>
+            </a:p>
+          </p:txBody>
+        </p:sp>
+      </p:grpSp>
     </p:spTree>
     <p:extLst>
       <p:ext uri="{BB962C8B-B14F-4D97-AF65-F5344CB8AC3E}">

</xml_diff>

<commit_message>
I added info to the Powerpoint and made temp or field changing a user option in IV_sweep.py
</commit_message>
<xml_diff>
--- a/Instructions_IV_SHH_measurement.pptx
+++ b/Instructions_IV_SHH_measurement.pptx
@@ -5,11 +5,12 @@
     <p:sldMasterId id="2147483648" r:id="rId1"/>
   </p:sldMasterIdLst>
   <p:notesMasterIdLst>
-    <p:notesMasterId r:id="rId4"/>
+    <p:notesMasterId r:id="rId5"/>
   </p:notesMasterIdLst>
   <p:sldIdLst>
     <p:sldId id="256" r:id="rId2"/>
-    <p:sldId id="257" r:id="rId3"/>
+    <p:sldId id="258" r:id="rId3"/>
+    <p:sldId id="257" r:id="rId4"/>
   </p:sldIdLst>
   <p:sldSz cx="12192000" cy="6858000"/>
   <p:notesSz cx="6858000" cy="9144000"/>
@@ -108,6 +109,11 @@
       </a:defRPr>
     </a:lvl9pPr>
   </p:defaultTextStyle>
+  <p:extLst>
+    <p:ext uri="{EFAFB233-063F-42B5-8137-9DF3F51BA10A}">
+      <p15:sldGuideLst xmlns:p15="http://schemas.microsoft.com/office/powerpoint/2012/main"/>
+    </p:ext>
+  </p:extLst>
 </p:presentation>
 </file>
 
@@ -193,7 +199,7 @@
           <a:p>
             <a:fld id="{E8C71F32-0FC6-4270-8BF0-88CE861DDA03}" type="datetimeFigureOut">
               <a:rPr lang="en-US" smtClean="0"/>
-              <a:t>1/9/2023</a:t>
+              <a:t>1/11/2023</a:t>
             </a:fld>
             <a:endParaRPr lang="en-US"/>
           </a:p>
@@ -526,7 +532,7 @@
           <a:p>
             <a:fld id="{13520325-68C9-4C26-BB93-28A359565A30}" type="slidenum">
               <a:rPr lang="en-US" smtClean="0"/>
-              <a:t>2</a:t>
+              <a:t>3</a:t>
             </a:fld>
             <a:endParaRPr lang="en-US"/>
           </a:p>
@@ -676,7 +682,7 @@
           <a:p>
             <a:fld id="{12575B7E-26A7-433C-A971-F0DA64043E00}" type="datetimeFigureOut">
               <a:rPr lang="en-US" smtClean="0"/>
-              <a:t>1/9/2023</a:t>
+              <a:t>1/11/2023</a:t>
             </a:fld>
             <a:endParaRPr lang="en-US"/>
           </a:p>
@@ -846,7 +852,7 @@
           <a:p>
             <a:fld id="{12575B7E-26A7-433C-A971-F0DA64043E00}" type="datetimeFigureOut">
               <a:rPr lang="en-US" smtClean="0"/>
-              <a:t>1/9/2023</a:t>
+              <a:t>1/11/2023</a:t>
             </a:fld>
             <a:endParaRPr lang="en-US"/>
           </a:p>
@@ -1026,7 +1032,7 @@
           <a:p>
             <a:fld id="{12575B7E-26A7-433C-A971-F0DA64043E00}" type="datetimeFigureOut">
               <a:rPr lang="en-US" smtClean="0"/>
-              <a:t>1/9/2023</a:t>
+              <a:t>1/11/2023</a:t>
             </a:fld>
             <a:endParaRPr lang="en-US"/>
           </a:p>
@@ -1196,7 +1202,7 @@
           <a:p>
             <a:fld id="{12575B7E-26A7-433C-A971-F0DA64043E00}" type="datetimeFigureOut">
               <a:rPr lang="en-US" smtClean="0"/>
-              <a:t>1/9/2023</a:t>
+              <a:t>1/11/2023</a:t>
             </a:fld>
             <a:endParaRPr lang="en-US"/>
           </a:p>
@@ -1442,7 +1448,7 @@
           <a:p>
             <a:fld id="{12575B7E-26A7-433C-A971-F0DA64043E00}" type="datetimeFigureOut">
               <a:rPr lang="en-US" smtClean="0"/>
-              <a:t>1/9/2023</a:t>
+              <a:t>1/11/2023</a:t>
             </a:fld>
             <a:endParaRPr lang="en-US"/>
           </a:p>
@@ -1674,7 +1680,7 @@
           <a:p>
             <a:fld id="{12575B7E-26A7-433C-A971-F0DA64043E00}" type="datetimeFigureOut">
               <a:rPr lang="en-US" smtClean="0"/>
-              <a:t>1/9/2023</a:t>
+              <a:t>1/11/2023</a:t>
             </a:fld>
             <a:endParaRPr lang="en-US"/>
           </a:p>
@@ -2041,7 +2047,7 @@
           <a:p>
             <a:fld id="{12575B7E-26A7-433C-A971-F0DA64043E00}" type="datetimeFigureOut">
               <a:rPr lang="en-US" smtClean="0"/>
-              <a:t>1/9/2023</a:t>
+              <a:t>1/11/2023</a:t>
             </a:fld>
             <a:endParaRPr lang="en-US"/>
           </a:p>
@@ -2159,7 +2165,7 @@
           <a:p>
             <a:fld id="{12575B7E-26A7-433C-A971-F0DA64043E00}" type="datetimeFigureOut">
               <a:rPr lang="en-US" smtClean="0"/>
-              <a:t>1/9/2023</a:t>
+              <a:t>1/11/2023</a:t>
             </a:fld>
             <a:endParaRPr lang="en-US"/>
           </a:p>
@@ -2254,7 +2260,7 @@
           <a:p>
             <a:fld id="{12575B7E-26A7-433C-A971-F0DA64043E00}" type="datetimeFigureOut">
               <a:rPr lang="en-US" smtClean="0"/>
-              <a:t>1/9/2023</a:t>
+              <a:t>1/11/2023</a:t>
             </a:fld>
             <a:endParaRPr lang="en-US"/>
           </a:p>
@@ -2531,7 +2537,7 @@
           <a:p>
             <a:fld id="{12575B7E-26A7-433C-A971-F0DA64043E00}" type="datetimeFigureOut">
               <a:rPr lang="en-US" smtClean="0"/>
-              <a:t>1/9/2023</a:t>
+              <a:t>1/11/2023</a:t>
             </a:fld>
             <a:endParaRPr lang="en-US"/>
           </a:p>
@@ -2784,7 +2790,7 @@
           <a:p>
             <a:fld id="{12575B7E-26A7-433C-A971-F0DA64043E00}" type="datetimeFigureOut">
               <a:rPr lang="en-US" smtClean="0"/>
-              <a:t>1/9/2023</a:t>
+              <a:t>1/11/2023</a:t>
             </a:fld>
             <a:endParaRPr lang="en-US"/>
           </a:p>
@@ -2997,7 +3003,7 @@
           <a:p>
             <a:fld id="{12575B7E-26A7-433C-A971-F0DA64043E00}" type="datetimeFigureOut">
               <a:rPr lang="en-US" smtClean="0"/>
-              <a:t>1/9/2023</a:t>
+              <a:t>1/11/2023</a:t>
             </a:fld>
             <a:endParaRPr lang="en-US"/>
           </a:p>
@@ -3454,6 +3460,2713 @@
 </file>
 
 <file path=ppt/slides/slide2.xml><?xml version="1.0" encoding="utf-8"?>
+<p:sld xmlns:a="http://schemas.openxmlformats.org/drawingml/2006/main" xmlns:r="http://schemas.openxmlformats.org/officeDocument/2006/relationships" xmlns:p="http://schemas.openxmlformats.org/presentationml/2006/main">
+  <p:cSld>
+    <p:spTree>
+      <p:nvGrpSpPr>
+        <p:cNvPr id="1" name=""/>
+        <p:cNvGrpSpPr/>
+        <p:nvPr/>
+      </p:nvGrpSpPr>
+      <p:grpSpPr>
+        <a:xfrm>
+          <a:off x="0" y="0"/>
+          <a:ext cx="0" cy="0"/>
+          <a:chOff x="0" y="0"/>
+          <a:chExt cx="0" cy="0"/>
+        </a:xfrm>
+      </p:grpSpPr>
+      <p:grpSp>
+        <p:nvGrpSpPr>
+          <p:cNvPr id="82" name="Group 81"/>
+          <p:cNvGrpSpPr/>
+          <p:nvPr/>
+        </p:nvGrpSpPr>
+        <p:grpSpPr>
+          <a:xfrm>
+            <a:off x="1344168" y="1700784"/>
+            <a:ext cx="6029388" cy="2139696"/>
+            <a:chOff x="1344168" y="1700784"/>
+            <a:chExt cx="6029388" cy="2139696"/>
+          </a:xfrm>
+        </p:grpSpPr>
+        <p:sp>
+          <p:nvSpPr>
+            <p:cNvPr id="2" name="Rectangle 1"/>
+            <p:cNvSpPr/>
+            <p:nvPr/>
+          </p:nvSpPr>
+          <p:spPr>
+            <a:xfrm>
+              <a:off x="1344168" y="1700784"/>
+              <a:ext cx="6029388" cy="2139696"/>
+            </a:xfrm>
+            <a:prstGeom prst="rect">
+              <a:avLst/>
+            </a:prstGeom>
+            <a:solidFill>
+              <a:schemeClr val="bg2">
+                <a:lumMod val="90000"/>
+              </a:schemeClr>
+            </a:solidFill>
+            <a:ln>
+              <a:solidFill>
+                <a:schemeClr val="tx1">
+                  <a:lumMod val="65000"/>
+                  <a:lumOff val="35000"/>
+                </a:schemeClr>
+              </a:solidFill>
+            </a:ln>
+          </p:spPr>
+          <p:style>
+            <a:lnRef idx="2">
+              <a:schemeClr val="accent1">
+                <a:shade val="50000"/>
+              </a:schemeClr>
+            </a:lnRef>
+            <a:fillRef idx="1">
+              <a:schemeClr val="accent1"/>
+            </a:fillRef>
+            <a:effectRef idx="0">
+              <a:schemeClr val="accent1"/>
+            </a:effectRef>
+            <a:fontRef idx="minor">
+              <a:schemeClr val="lt1"/>
+            </a:fontRef>
+          </p:style>
+          <p:txBody>
+            <a:bodyPr rtlCol="0" anchor="ctr"/>
+            <a:lstStyle/>
+            <a:p>
+              <a:pPr algn="ctr"/>
+              <a:endParaRPr lang="en-US"/>
+            </a:p>
+          </p:txBody>
+        </p:sp>
+        <p:grpSp>
+          <p:nvGrpSpPr>
+            <p:cNvPr id="9" name="Group 8"/>
+            <p:cNvGrpSpPr/>
+            <p:nvPr/>
+          </p:nvGrpSpPr>
+          <p:grpSpPr>
+            <a:xfrm>
+              <a:off x="1923288" y="2103120"/>
+              <a:ext cx="4896612" cy="329184"/>
+              <a:chOff x="1923288" y="2039112"/>
+              <a:chExt cx="4896612" cy="329184"/>
+            </a:xfrm>
+          </p:grpSpPr>
+          <p:sp>
+            <p:nvSpPr>
+              <p:cNvPr id="3" name="Oval 2"/>
+              <p:cNvSpPr/>
+              <p:nvPr/>
+            </p:nvSpPr>
+            <p:spPr>
+              <a:xfrm>
+                <a:off x="1923288" y="2039112"/>
+                <a:ext cx="329184" cy="329184"/>
+              </a:xfrm>
+              <a:prstGeom prst="ellipse">
+                <a:avLst/>
+              </a:prstGeom>
+              <a:solidFill>
+                <a:schemeClr val="bg1">
+                  <a:lumMod val="50000"/>
+                </a:schemeClr>
+              </a:solidFill>
+              <a:ln>
+                <a:solidFill>
+                  <a:schemeClr val="bg2">
+                    <a:lumMod val="25000"/>
+                  </a:schemeClr>
+                </a:solidFill>
+              </a:ln>
+            </p:spPr>
+            <p:style>
+              <a:lnRef idx="2">
+                <a:schemeClr val="accent1">
+                  <a:shade val="50000"/>
+                </a:schemeClr>
+              </a:lnRef>
+              <a:fillRef idx="1">
+                <a:schemeClr val="accent1"/>
+              </a:fillRef>
+              <a:effectRef idx="0">
+                <a:schemeClr val="accent1"/>
+              </a:effectRef>
+              <a:fontRef idx="minor">
+                <a:schemeClr val="lt1"/>
+              </a:fontRef>
+            </p:style>
+            <p:txBody>
+              <a:bodyPr rtlCol="0" anchor="ctr"/>
+              <a:lstStyle/>
+              <a:p>
+                <a:pPr algn="ctr"/>
+                <a:endParaRPr lang="en-US"/>
+              </a:p>
+            </p:txBody>
+          </p:sp>
+          <p:sp>
+            <p:nvSpPr>
+              <p:cNvPr id="4" name="Oval 3"/>
+              <p:cNvSpPr/>
+              <p:nvPr/>
+            </p:nvSpPr>
+            <p:spPr>
+              <a:xfrm>
+                <a:off x="2776728" y="2039112"/>
+                <a:ext cx="329184" cy="329184"/>
+              </a:xfrm>
+              <a:prstGeom prst="ellipse">
+                <a:avLst/>
+              </a:prstGeom>
+              <a:solidFill>
+                <a:schemeClr val="bg1">
+                  <a:lumMod val="50000"/>
+                </a:schemeClr>
+              </a:solidFill>
+              <a:ln>
+                <a:solidFill>
+                  <a:schemeClr val="bg2">
+                    <a:lumMod val="25000"/>
+                  </a:schemeClr>
+                </a:solidFill>
+              </a:ln>
+            </p:spPr>
+            <p:style>
+              <a:lnRef idx="2">
+                <a:schemeClr val="accent1">
+                  <a:shade val="50000"/>
+                </a:schemeClr>
+              </a:lnRef>
+              <a:fillRef idx="1">
+                <a:schemeClr val="accent1"/>
+              </a:fillRef>
+              <a:effectRef idx="0">
+                <a:schemeClr val="accent1"/>
+              </a:effectRef>
+              <a:fontRef idx="minor">
+                <a:schemeClr val="lt1"/>
+              </a:fontRef>
+            </p:style>
+            <p:txBody>
+              <a:bodyPr rtlCol="0" anchor="ctr"/>
+              <a:lstStyle/>
+              <a:p>
+                <a:pPr algn="ctr"/>
+                <a:endParaRPr lang="en-US"/>
+              </a:p>
+            </p:txBody>
+          </p:sp>
+          <p:sp>
+            <p:nvSpPr>
+              <p:cNvPr id="5" name="Oval 4"/>
+              <p:cNvSpPr/>
+              <p:nvPr/>
+            </p:nvSpPr>
+            <p:spPr>
+              <a:xfrm>
+                <a:off x="3825240" y="2039112"/>
+                <a:ext cx="329184" cy="329184"/>
+              </a:xfrm>
+              <a:prstGeom prst="ellipse">
+                <a:avLst/>
+              </a:prstGeom>
+              <a:solidFill>
+                <a:schemeClr val="bg1">
+                  <a:lumMod val="50000"/>
+                </a:schemeClr>
+              </a:solidFill>
+              <a:ln>
+                <a:solidFill>
+                  <a:schemeClr val="bg2">
+                    <a:lumMod val="25000"/>
+                  </a:schemeClr>
+                </a:solidFill>
+              </a:ln>
+            </p:spPr>
+            <p:style>
+              <a:lnRef idx="2">
+                <a:schemeClr val="accent1">
+                  <a:shade val="50000"/>
+                </a:schemeClr>
+              </a:lnRef>
+              <a:fillRef idx="1">
+                <a:schemeClr val="accent1"/>
+              </a:fillRef>
+              <a:effectRef idx="0">
+                <a:schemeClr val="accent1"/>
+              </a:effectRef>
+              <a:fontRef idx="minor">
+                <a:schemeClr val="lt1"/>
+              </a:fontRef>
+            </p:style>
+            <p:txBody>
+              <a:bodyPr rtlCol="0" anchor="ctr"/>
+              <a:lstStyle/>
+              <a:p>
+                <a:pPr algn="ctr"/>
+                <a:endParaRPr lang="en-US"/>
+              </a:p>
+            </p:txBody>
+          </p:sp>
+          <p:sp>
+            <p:nvSpPr>
+              <p:cNvPr id="6" name="Oval 5"/>
+              <p:cNvSpPr/>
+              <p:nvPr/>
+            </p:nvSpPr>
+            <p:spPr>
+              <a:xfrm>
+                <a:off x="4683252" y="2039112"/>
+                <a:ext cx="329184" cy="329184"/>
+              </a:xfrm>
+              <a:prstGeom prst="ellipse">
+                <a:avLst/>
+              </a:prstGeom>
+              <a:solidFill>
+                <a:schemeClr val="bg1">
+                  <a:lumMod val="50000"/>
+                </a:schemeClr>
+              </a:solidFill>
+              <a:ln>
+                <a:solidFill>
+                  <a:schemeClr val="bg2">
+                    <a:lumMod val="25000"/>
+                  </a:schemeClr>
+                </a:solidFill>
+              </a:ln>
+            </p:spPr>
+            <p:style>
+              <a:lnRef idx="2">
+                <a:schemeClr val="accent1">
+                  <a:shade val="50000"/>
+                </a:schemeClr>
+              </a:lnRef>
+              <a:fillRef idx="1">
+                <a:schemeClr val="accent1"/>
+              </a:fillRef>
+              <a:effectRef idx="0">
+                <a:schemeClr val="accent1"/>
+              </a:effectRef>
+              <a:fontRef idx="minor">
+                <a:schemeClr val="lt1"/>
+              </a:fontRef>
+            </p:style>
+            <p:txBody>
+              <a:bodyPr rtlCol="0" anchor="ctr"/>
+              <a:lstStyle/>
+              <a:p>
+                <a:pPr algn="ctr"/>
+                <a:endParaRPr lang="en-US"/>
+              </a:p>
+            </p:txBody>
+          </p:sp>
+          <p:sp>
+            <p:nvSpPr>
+              <p:cNvPr id="7" name="Oval 6"/>
+              <p:cNvSpPr/>
+              <p:nvPr/>
+            </p:nvSpPr>
+            <p:spPr>
+              <a:xfrm>
+                <a:off x="6490716" y="2039112"/>
+                <a:ext cx="329184" cy="329184"/>
+              </a:xfrm>
+              <a:prstGeom prst="ellipse">
+                <a:avLst/>
+              </a:prstGeom>
+              <a:solidFill>
+                <a:schemeClr val="bg1">
+                  <a:lumMod val="50000"/>
+                </a:schemeClr>
+              </a:solidFill>
+              <a:ln>
+                <a:solidFill>
+                  <a:schemeClr val="bg2">
+                    <a:lumMod val="25000"/>
+                  </a:schemeClr>
+                </a:solidFill>
+              </a:ln>
+            </p:spPr>
+            <p:style>
+              <a:lnRef idx="2">
+                <a:schemeClr val="accent1">
+                  <a:shade val="50000"/>
+                </a:schemeClr>
+              </a:lnRef>
+              <a:fillRef idx="1">
+                <a:schemeClr val="accent1"/>
+              </a:fillRef>
+              <a:effectRef idx="0">
+                <a:schemeClr val="accent1"/>
+              </a:effectRef>
+              <a:fontRef idx="minor">
+                <a:schemeClr val="lt1"/>
+              </a:fontRef>
+            </p:style>
+            <p:txBody>
+              <a:bodyPr rtlCol="0" anchor="ctr"/>
+              <a:lstStyle/>
+              <a:p>
+                <a:pPr algn="ctr"/>
+                <a:endParaRPr lang="en-US"/>
+              </a:p>
+            </p:txBody>
+          </p:sp>
+          <p:sp>
+            <p:nvSpPr>
+              <p:cNvPr id="8" name="Oval 7"/>
+              <p:cNvSpPr/>
+              <p:nvPr/>
+            </p:nvSpPr>
+            <p:spPr>
+              <a:xfrm>
+                <a:off x="5632704" y="2039112"/>
+                <a:ext cx="329184" cy="329184"/>
+              </a:xfrm>
+              <a:prstGeom prst="ellipse">
+                <a:avLst/>
+              </a:prstGeom>
+              <a:solidFill>
+                <a:schemeClr val="bg1">
+                  <a:lumMod val="50000"/>
+                </a:schemeClr>
+              </a:solidFill>
+              <a:ln>
+                <a:solidFill>
+                  <a:schemeClr val="bg2">
+                    <a:lumMod val="25000"/>
+                  </a:schemeClr>
+                </a:solidFill>
+              </a:ln>
+            </p:spPr>
+            <p:style>
+              <a:lnRef idx="2">
+                <a:schemeClr val="accent1">
+                  <a:shade val="50000"/>
+                </a:schemeClr>
+              </a:lnRef>
+              <a:fillRef idx="1">
+                <a:schemeClr val="accent1"/>
+              </a:fillRef>
+              <a:effectRef idx="0">
+                <a:schemeClr val="accent1"/>
+              </a:effectRef>
+              <a:fontRef idx="minor">
+                <a:schemeClr val="lt1"/>
+              </a:fontRef>
+            </p:style>
+            <p:txBody>
+              <a:bodyPr rtlCol="0" anchor="ctr"/>
+              <a:lstStyle/>
+              <a:p>
+                <a:pPr algn="ctr"/>
+                <a:endParaRPr lang="en-US"/>
+              </a:p>
+            </p:txBody>
+          </p:sp>
+        </p:grpSp>
+        <p:grpSp>
+          <p:nvGrpSpPr>
+            <p:cNvPr id="10" name="Group 9"/>
+            <p:cNvGrpSpPr/>
+            <p:nvPr/>
+          </p:nvGrpSpPr>
+          <p:grpSpPr>
+            <a:xfrm>
+              <a:off x="1959864" y="3049524"/>
+              <a:ext cx="4896612" cy="329184"/>
+              <a:chOff x="1923288" y="2039112"/>
+              <a:chExt cx="4896612" cy="329184"/>
+            </a:xfrm>
+          </p:grpSpPr>
+          <p:sp>
+            <p:nvSpPr>
+              <p:cNvPr id="11" name="Oval 10"/>
+              <p:cNvSpPr/>
+              <p:nvPr/>
+            </p:nvSpPr>
+            <p:spPr>
+              <a:xfrm>
+                <a:off x="1923288" y="2039112"/>
+                <a:ext cx="329184" cy="329184"/>
+              </a:xfrm>
+              <a:prstGeom prst="ellipse">
+                <a:avLst/>
+              </a:prstGeom>
+              <a:solidFill>
+                <a:schemeClr val="bg1">
+                  <a:lumMod val="50000"/>
+                </a:schemeClr>
+              </a:solidFill>
+              <a:ln>
+                <a:solidFill>
+                  <a:schemeClr val="bg2">
+                    <a:lumMod val="25000"/>
+                  </a:schemeClr>
+                </a:solidFill>
+              </a:ln>
+            </p:spPr>
+            <p:style>
+              <a:lnRef idx="2">
+                <a:schemeClr val="accent1">
+                  <a:shade val="50000"/>
+                </a:schemeClr>
+              </a:lnRef>
+              <a:fillRef idx="1">
+                <a:schemeClr val="accent1"/>
+              </a:fillRef>
+              <a:effectRef idx="0">
+                <a:schemeClr val="accent1"/>
+              </a:effectRef>
+              <a:fontRef idx="minor">
+                <a:schemeClr val="lt1"/>
+              </a:fontRef>
+            </p:style>
+            <p:txBody>
+              <a:bodyPr rtlCol="0" anchor="ctr"/>
+              <a:lstStyle/>
+              <a:p>
+                <a:pPr algn="ctr"/>
+                <a:endParaRPr lang="en-US"/>
+              </a:p>
+            </p:txBody>
+          </p:sp>
+          <p:sp>
+            <p:nvSpPr>
+              <p:cNvPr id="12" name="Oval 11"/>
+              <p:cNvSpPr/>
+              <p:nvPr/>
+            </p:nvSpPr>
+            <p:spPr>
+              <a:xfrm>
+                <a:off x="2776728" y="2039112"/>
+                <a:ext cx="329184" cy="329184"/>
+              </a:xfrm>
+              <a:prstGeom prst="ellipse">
+                <a:avLst/>
+              </a:prstGeom>
+              <a:solidFill>
+                <a:schemeClr val="bg1">
+                  <a:lumMod val="50000"/>
+                </a:schemeClr>
+              </a:solidFill>
+              <a:ln>
+                <a:solidFill>
+                  <a:schemeClr val="bg2">
+                    <a:lumMod val="25000"/>
+                  </a:schemeClr>
+                </a:solidFill>
+              </a:ln>
+            </p:spPr>
+            <p:style>
+              <a:lnRef idx="2">
+                <a:schemeClr val="accent1">
+                  <a:shade val="50000"/>
+                </a:schemeClr>
+              </a:lnRef>
+              <a:fillRef idx="1">
+                <a:schemeClr val="accent1"/>
+              </a:fillRef>
+              <a:effectRef idx="0">
+                <a:schemeClr val="accent1"/>
+              </a:effectRef>
+              <a:fontRef idx="minor">
+                <a:schemeClr val="lt1"/>
+              </a:fontRef>
+            </p:style>
+            <p:txBody>
+              <a:bodyPr rtlCol="0" anchor="ctr"/>
+              <a:lstStyle/>
+              <a:p>
+                <a:pPr algn="ctr"/>
+                <a:endParaRPr lang="en-US"/>
+              </a:p>
+            </p:txBody>
+          </p:sp>
+          <p:sp>
+            <p:nvSpPr>
+              <p:cNvPr id="13" name="Oval 12"/>
+              <p:cNvSpPr/>
+              <p:nvPr/>
+            </p:nvSpPr>
+            <p:spPr>
+              <a:xfrm>
+                <a:off x="3825240" y="2039112"/>
+                <a:ext cx="329184" cy="329184"/>
+              </a:xfrm>
+              <a:prstGeom prst="ellipse">
+                <a:avLst/>
+              </a:prstGeom>
+              <a:solidFill>
+                <a:schemeClr val="bg1">
+                  <a:lumMod val="50000"/>
+                </a:schemeClr>
+              </a:solidFill>
+              <a:ln>
+                <a:solidFill>
+                  <a:schemeClr val="bg2">
+                    <a:lumMod val="25000"/>
+                  </a:schemeClr>
+                </a:solidFill>
+              </a:ln>
+            </p:spPr>
+            <p:style>
+              <a:lnRef idx="2">
+                <a:schemeClr val="accent1">
+                  <a:shade val="50000"/>
+                </a:schemeClr>
+              </a:lnRef>
+              <a:fillRef idx="1">
+                <a:schemeClr val="accent1"/>
+              </a:fillRef>
+              <a:effectRef idx="0">
+                <a:schemeClr val="accent1"/>
+              </a:effectRef>
+              <a:fontRef idx="minor">
+                <a:schemeClr val="lt1"/>
+              </a:fontRef>
+            </p:style>
+            <p:txBody>
+              <a:bodyPr rtlCol="0" anchor="ctr"/>
+              <a:lstStyle/>
+              <a:p>
+                <a:pPr algn="ctr"/>
+                <a:endParaRPr lang="en-US"/>
+              </a:p>
+            </p:txBody>
+          </p:sp>
+          <p:sp>
+            <p:nvSpPr>
+              <p:cNvPr id="14" name="Oval 13"/>
+              <p:cNvSpPr/>
+              <p:nvPr/>
+            </p:nvSpPr>
+            <p:spPr>
+              <a:xfrm>
+                <a:off x="4683252" y="2039112"/>
+                <a:ext cx="329184" cy="329184"/>
+              </a:xfrm>
+              <a:prstGeom prst="ellipse">
+                <a:avLst/>
+              </a:prstGeom>
+              <a:solidFill>
+                <a:schemeClr val="bg1">
+                  <a:lumMod val="50000"/>
+                </a:schemeClr>
+              </a:solidFill>
+              <a:ln>
+                <a:solidFill>
+                  <a:schemeClr val="bg2">
+                    <a:lumMod val="25000"/>
+                  </a:schemeClr>
+                </a:solidFill>
+              </a:ln>
+            </p:spPr>
+            <p:style>
+              <a:lnRef idx="2">
+                <a:schemeClr val="accent1">
+                  <a:shade val="50000"/>
+                </a:schemeClr>
+              </a:lnRef>
+              <a:fillRef idx="1">
+                <a:schemeClr val="accent1"/>
+              </a:fillRef>
+              <a:effectRef idx="0">
+                <a:schemeClr val="accent1"/>
+              </a:effectRef>
+              <a:fontRef idx="minor">
+                <a:schemeClr val="lt1"/>
+              </a:fontRef>
+            </p:style>
+            <p:txBody>
+              <a:bodyPr rtlCol="0" anchor="ctr"/>
+              <a:lstStyle/>
+              <a:p>
+                <a:pPr algn="ctr"/>
+                <a:endParaRPr lang="en-US"/>
+              </a:p>
+            </p:txBody>
+          </p:sp>
+          <p:sp>
+            <p:nvSpPr>
+              <p:cNvPr id="15" name="Oval 14"/>
+              <p:cNvSpPr/>
+              <p:nvPr/>
+            </p:nvSpPr>
+            <p:spPr>
+              <a:xfrm>
+                <a:off x="6490716" y="2039112"/>
+                <a:ext cx="329184" cy="329184"/>
+              </a:xfrm>
+              <a:prstGeom prst="ellipse">
+                <a:avLst/>
+              </a:prstGeom>
+              <a:solidFill>
+                <a:schemeClr val="bg1">
+                  <a:lumMod val="50000"/>
+                </a:schemeClr>
+              </a:solidFill>
+              <a:ln>
+                <a:solidFill>
+                  <a:schemeClr val="bg2">
+                    <a:lumMod val="25000"/>
+                  </a:schemeClr>
+                </a:solidFill>
+              </a:ln>
+            </p:spPr>
+            <p:style>
+              <a:lnRef idx="2">
+                <a:schemeClr val="accent1">
+                  <a:shade val="50000"/>
+                </a:schemeClr>
+              </a:lnRef>
+              <a:fillRef idx="1">
+                <a:schemeClr val="accent1"/>
+              </a:fillRef>
+              <a:effectRef idx="0">
+                <a:schemeClr val="accent1"/>
+              </a:effectRef>
+              <a:fontRef idx="minor">
+                <a:schemeClr val="lt1"/>
+              </a:fontRef>
+            </p:style>
+            <p:txBody>
+              <a:bodyPr rtlCol="0" anchor="ctr"/>
+              <a:lstStyle/>
+              <a:p>
+                <a:pPr algn="ctr"/>
+                <a:endParaRPr lang="en-US"/>
+              </a:p>
+            </p:txBody>
+          </p:sp>
+          <p:sp>
+            <p:nvSpPr>
+              <p:cNvPr id="16" name="Oval 15"/>
+              <p:cNvSpPr/>
+              <p:nvPr/>
+            </p:nvSpPr>
+            <p:spPr>
+              <a:xfrm>
+                <a:off x="5632704" y="2039112"/>
+                <a:ext cx="329184" cy="329184"/>
+              </a:xfrm>
+              <a:prstGeom prst="ellipse">
+                <a:avLst/>
+              </a:prstGeom>
+              <a:solidFill>
+                <a:schemeClr val="bg1">
+                  <a:lumMod val="50000"/>
+                </a:schemeClr>
+              </a:solidFill>
+              <a:ln>
+                <a:solidFill>
+                  <a:schemeClr val="bg2">
+                    <a:lumMod val="25000"/>
+                  </a:schemeClr>
+                </a:solidFill>
+              </a:ln>
+            </p:spPr>
+            <p:style>
+              <a:lnRef idx="2">
+                <a:schemeClr val="accent1">
+                  <a:shade val="50000"/>
+                </a:schemeClr>
+              </a:lnRef>
+              <a:fillRef idx="1">
+                <a:schemeClr val="accent1"/>
+              </a:fillRef>
+              <a:effectRef idx="0">
+                <a:schemeClr val="accent1"/>
+              </a:effectRef>
+              <a:fontRef idx="minor">
+                <a:schemeClr val="lt1"/>
+              </a:fontRef>
+            </p:style>
+            <p:txBody>
+              <a:bodyPr rtlCol="0" anchor="ctr"/>
+              <a:lstStyle/>
+              <a:p>
+                <a:pPr algn="ctr"/>
+                <a:endParaRPr lang="en-US"/>
+              </a:p>
+            </p:txBody>
+          </p:sp>
+        </p:grpSp>
+        <p:sp>
+          <p:nvSpPr>
+            <p:cNvPr id="17" name="TextBox 16"/>
+            <p:cNvSpPr txBox="1"/>
+            <p:nvPr/>
+          </p:nvSpPr>
+          <p:spPr>
+            <a:xfrm>
+              <a:off x="1619460" y="1913489"/>
+              <a:ext cx="437940" cy="307777"/>
+            </a:xfrm>
+            <a:prstGeom prst="rect">
+              <a:avLst/>
+            </a:prstGeom>
+            <a:noFill/>
+          </p:spPr>
+          <p:txBody>
+            <a:bodyPr wrap="none" rtlCol="0">
+              <a:spAutoFit/>
+            </a:bodyPr>
+            <a:lstStyle/>
+            <a:p>
+              <a:r>
+                <a:rPr lang="en-US" sz="1400" dirty="0" smtClean="0"/>
+                <a:t>1V</a:t>
+              </a:r>
+              <a:r>
+                <a:rPr lang="en-US" sz="1400" baseline="30000" dirty="0" smtClean="0"/>
+                <a:t>+</a:t>
+              </a:r>
+              <a:endParaRPr lang="en-US" sz="1400" baseline="30000" dirty="0"/>
+            </a:p>
+          </p:txBody>
+        </p:sp>
+        <p:sp>
+          <p:nvSpPr>
+            <p:cNvPr id="18" name="TextBox 17"/>
+            <p:cNvSpPr txBox="1"/>
+            <p:nvPr/>
+          </p:nvSpPr>
+          <p:spPr>
+            <a:xfrm>
+              <a:off x="3551892" y="1932610"/>
+              <a:ext cx="437940" cy="307777"/>
+            </a:xfrm>
+            <a:prstGeom prst="rect">
+              <a:avLst/>
+            </a:prstGeom>
+            <a:noFill/>
+          </p:spPr>
+          <p:txBody>
+            <a:bodyPr wrap="none" rtlCol="0">
+              <a:spAutoFit/>
+            </a:bodyPr>
+            <a:lstStyle/>
+            <a:p>
+              <a:r>
+                <a:rPr lang="en-US" sz="1400" dirty="0"/>
+                <a:t>2</a:t>
+              </a:r>
+              <a:r>
+                <a:rPr lang="en-US" sz="1400" dirty="0" smtClean="0"/>
+                <a:t>V</a:t>
+              </a:r>
+              <a:r>
+                <a:rPr lang="en-US" sz="1400" baseline="30000" dirty="0" smtClean="0"/>
+                <a:t>+</a:t>
+              </a:r>
+              <a:endParaRPr lang="en-US" sz="1400" baseline="30000" dirty="0"/>
+            </a:p>
+          </p:txBody>
+        </p:sp>
+        <p:sp>
+          <p:nvSpPr>
+            <p:cNvPr id="19" name="TextBox 18"/>
+            <p:cNvSpPr txBox="1"/>
+            <p:nvPr/>
+          </p:nvSpPr>
+          <p:spPr>
+            <a:xfrm>
+              <a:off x="5413734" y="1913488"/>
+              <a:ext cx="437940" cy="307777"/>
+            </a:xfrm>
+            <a:prstGeom prst="rect">
+              <a:avLst/>
+            </a:prstGeom>
+            <a:noFill/>
+          </p:spPr>
+          <p:txBody>
+            <a:bodyPr wrap="none" rtlCol="0">
+              <a:spAutoFit/>
+            </a:bodyPr>
+            <a:lstStyle/>
+            <a:p>
+              <a:r>
+                <a:rPr lang="en-US" sz="1400" dirty="0"/>
+                <a:t>3</a:t>
+              </a:r>
+              <a:r>
+                <a:rPr lang="en-US" sz="1400" dirty="0" smtClean="0"/>
+                <a:t>V</a:t>
+              </a:r>
+              <a:r>
+                <a:rPr lang="en-US" sz="1400" baseline="30000" dirty="0" smtClean="0"/>
+                <a:t>+</a:t>
+              </a:r>
+              <a:endParaRPr lang="en-US" sz="1400" baseline="30000" dirty="0"/>
+            </a:p>
+          </p:txBody>
+        </p:sp>
+        <p:sp>
+          <p:nvSpPr>
+            <p:cNvPr id="20" name="TextBox 19"/>
+            <p:cNvSpPr txBox="1"/>
+            <p:nvPr/>
+          </p:nvSpPr>
+          <p:spPr>
+            <a:xfrm>
+              <a:off x="1686516" y="2906339"/>
+              <a:ext cx="415498" cy="307777"/>
+            </a:xfrm>
+            <a:prstGeom prst="rect">
+              <a:avLst/>
+            </a:prstGeom>
+            <a:noFill/>
+          </p:spPr>
+          <p:txBody>
+            <a:bodyPr wrap="none" rtlCol="0">
+              <a:spAutoFit/>
+            </a:bodyPr>
+            <a:lstStyle/>
+            <a:p>
+              <a:r>
+                <a:rPr lang="en-US" sz="1400" dirty="0" smtClean="0"/>
+                <a:t>1V</a:t>
+              </a:r>
+              <a:r>
+                <a:rPr lang="en-US" sz="1400" baseline="30000" dirty="0"/>
+                <a:t>-</a:t>
+              </a:r>
+            </a:p>
+          </p:txBody>
+        </p:sp>
+        <p:sp>
+          <p:nvSpPr>
+            <p:cNvPr id="21" name="TextBox 20"/>
+            <p:cNvSpPr txBox="1"/>
+            <p:nvPr/>
+          </p:nvSpPr>
+          <p:spPr>
+            <a:xfrm>
+              <a:off x="3610910" y="2906339"/>
+              <a:ext cx="415498" cy="307777"/>
+            </a:xfrm>
+            <a:prstGeom prst="rect">
+              <a:avLst/>
+            </a:prstGeom>
+            <a:noFill/>
+          </p:spPr>
+          <p:txBody>
+            <a:bodyPr wrap="none" rtlCol="0">
+              <a:spAutoFit/>
+            </a:bodyPr>
+            <a:lstStyle/>
+            <a:p>
+              <a:r>
+                <a:rPr lang="en-US" sz="1400" dirty="0"/>
+                <a:t>2</a:t>
+              </a:r>
+              <a:r>
+                <a:rPr lang="en-US" sz="1400" dirty="0" smtClean="0"/>
+                <a:t>V</a:t>
+              </a:r>
+              <a:r>
+                <a:rPr lang="en-US" sz="1400" baseline="30000" dirty="0" smtClean="0"/>
+                <a:t>-</a:t>
+              </a:r>
+              <a:endParaRPr lang="en-US" sz="1400" baseline="30000" dirty="0"/>
+            </a:p>
+          </p:txBody>
+        </p:sp>
+        <p:sp>
+          <p:nvSpPr>
+            <p:cNvPr id="22" name="TextBox 21"/>
+            <p:cNvSpPr txBox="1"/>
+            <p:nvPr/>
+          </p:nvSpPr>
+          <p:spPr>
+            <a:xfrm>
+              <a:off x="5424955" y="2909493"/>
+              <a:ext cx="415498" cy="307777"/>
+            </a:xfrm>
+            <a:prstGeom prst="rect">
+              <a:avLst/>
+            </a:prstGeom>
+            <a:noFill/>
+          </p:spPr>
+          <p:txBody>
+            <a:bodyPr wrap="none" rtlCol="0">
+              <a:spAutoFit/>
+            </a:bodyPr>
+            <a:lstStyle/>
+            <a:p>
+              <a:r>
+                <a:rPr lang="en-US" sz="1400" dirty="0" smtClean="0"/>
+                <a:t>3V</a:t>
+              </a:r>
+              <a:r>
+                <a:rPr lang="en-US" sz="1400" baseline="30000" dirty="0" smtClean="0"/>
+                <a:t>-</a:t>
+              </a:r>
+              <a:endParaRPr lang="en-US" sz="1400" baseline="30000" dirty="0"/>
+            </a:p>
+          </p:txBody>
+        </p:sp>
+        <p:sp>
+          <p:nvSpPr>
+            <p:cNvPr id="23" name="TextBox 22"/>
+            <p:cNvSpPr txBox="1"/>
+            <p:nvPr/>
+          </p:nvSpPr>
+          <p:spPr>
+            <a:xfrm>
+              <a:off x="2486684" y="1932610"/>
+              <a:ext cx="380232" cy="307777"/>
+            </a:xfrm>
+            <a:prstGeom prst="rect">
+              <a:avLst/>
+            </a:prstGeom>
+            <a:noFill/>
+          </p:spPr>
+          <p:txBody>
+            <a:bodyPr wrap="none" rtlCol="0">
+              <a:spAutoFit/>
+            </a:bodyPr>
+            <a:lstStyle/>
+            <a:p>
+              <a:r>
+                <a:rPr lang="en-US" sz="1400" dirty="0" smtClean="0"/>
+                <a:t>1I</a:t>
+              </a:r>
+              <a:r>
+                <a:rPr lang="en-US" sz="1400" baseline="30000" dirty="0"/>
+                <a:t>+</a:t>
+              </a:r>
+            </a:p>
+          </p:txBody>
+        </p:sp>
+        <p:sp>
+          <p:nvSpPr>
+            <p:cNvPr id="24" name="TextBox 23"/>
+            <p:cNvSpPr txBox="1"/>
+            <p:nvPr/>
+          </p:nvSpPr>
+          <p:spPr>
+            <a:xfrm>
+              <a:off x="4435812" y="1959935"/>
+              <a:ext cx="380232" cy="307777"/>
+            </a:xfrm>
+            <a:prstGeom prst="rect">
+              <a:avLst/>
+            </a:prstGeom>
+            <a:noFill/>
+          </p:spPr>
+          <p:txBody>
+            <a:bodyPr wrap="none" rtlCol="0">
+              <a:spAutoFit/>
+            </a:bodyPr>
+            <a:lstStyle/>
+            <a:p>
+              <a:r>
+                <a:rPr lang="en-US" sz="1400" dirty="0"/>
+                <a:t>2</a:t>
+              </a:r>
+              <a:r>
+                <a:rPr lang="en-US" sz="1400" dirty="0" smtClean="0"/>
+                <a:t>I</a:t>
+              </a:r>
+              <a:r>
+                <a:rPr lang="en-US" sz="1400" baseline="30000" dirty="0"/>
+                <a:t>+</a:t>
+              </a:r>
+            </a:p>
+          </p:txBody>
+        </p:sp>
+        <p:sp>
+          <p:nvSpPr>
+            <p:cNvPr id="25" name="TextBox 24"/>
+            <p:cNvSpPr txBox="1"/>
+            <p:nvPr/>
+          </p:nvSpPr>
+          <p:spPr>
+            <a:xfrm>
+              <a:off x="6246222" y="1913487"/>
+              <a:ext cx="380232" cy="307777"/>
+            </a:xfrm>
+            <a:prstGeom prst="rect">
+              <a:avLst/>
+            </a:prstGeom>
+            <a:noFill/>
+          </p:spPr>
+          <p:txBody>
+            <a:bodyPr wrap="none" rtlCol="0">
+              <a:spAutoFit/>
+            </a:bodyPr>
+            <a:lstStyle/>
+            <a:p>
+              <a:r>
+                <a:rPr lang="en-US" sz="1400" dirty="0"/>
+                <a:t>3</a:t>
+              </a:r>
+              <a:r>
+                <a:rPr lang="en-US" sz="1400" dirty="0" smtClean="0"/>
+                <a:t>I</a:t>
+              </a:r>
+              <a:r>
+                <a:rPr lang="en-US" sz="1400" baseline="30000" dirty="0"/>
+                <a:t>+</a:t>
+              </a:r>
+            </a:p>
+          </p:txBody>
+        </p:sp>
+        <p:sp>
+          <p:nvSpPr>
+            <p:cNvPr id="26" name="TextBox 25"/>
+            <p:cNvSpPr txBox="1"/>
+            <p:nvPr/>
+          </p:nvSpPr>
+          <p:spPr>
+            <a:xfrm>
+              <a:off x="2611171" y="2906339"/>
+              <a:ext cx="357790" cy="307777"/>
+            </a:xfrm>
+            <a:prstGeom prst="rect">
+              <a:avLst/>
+            </a:prstGeom>
+            <a:noFill/>
+          </p:spPr>
+          <p:txBody>
+            <a:bodyPr wrap="none" rtlCol="0">
+              <a:spAutoFit/>
+            </a:bodyPr>
+            <a:lstStyle/>
+            <a:p>
+              <a:r>
+                <a:rPr lang="en-US" sz="1400" dirty="0" smtClean="0"/>
+                <a:t>1I</a:t>
+              </a:r>
+              <a:r>
+                <a:rPr lang="en-US" sz="1400" baseline="30000" dirty="0" smtClean="0"/>
+                <a:t>-</a:t>
+              </a:r>
+              <a:endParaRPr lang="en-US" sz="1400" baseline="30000" dirty="0"/>
+            </a:p>
+          </p:txBody>
+        </p:sp>
+        <p:sp>
+          <p:nvSpPr>
+            <p:cNvPr id="27" name="TextBox 26"/>
+            <p:cNvSpPr txBox="1"/>
+            <p:nvPr/>
+          </p:nvSpPr>
+          <p:spPr>
+            <a:xfrm>
+              <a:off x="4504357" y="2909493"/>
+              <a:ext cx="357790" cy="307777"/>
+            </a:xfrm>
+            <a:prstGeom prst="rect">
+              <a:avLst/>
+            </a:prstGeom>
+            <a:noFill/>
+          </p:spPr>
+          <p:txBody>
+            <a:bodyPr wrap="none" rtlCol="0">
+              <a:spAutoFit/>
+            </a:bodyPr>
+            <a:lstStyle/>
+            <a:p>
+              <a:r>
+                <a:rPr lang="en-US" sz="1400" dirty="0"/>
+                <a:t>2</a:t>
+              </a:r>
+              <a:r>
+                <a:rPr lang="en-US" sz="1400" dirty="0" smtClean="0"/>
+                <a:t>I</a:t>
+              </a:r>
+              <a:r>
+                <a:rPr lang="en-US" sz="1400" baseline="30000" dirty="0" smtClean="0"/>
+                <a:t>-</a:t>
+              </a:r>
+              <a:endParaRPr lang="en-US" sz="1400" baseline="30000" dirty="0"/>
+            </a:p>
+          </p:txBody>
+        </p:sp>
+        <p:sp>
+          <p:nvSpPr>
+            <p:cNvPr id="28" name="TextBox 27"/>
+            <p:cNvSpPr txBox="1"/>
+            <p:nvPr/>
+          </p:nvSpPr>
+          <p:spPr>
+            <a:xfrm>
+              <a:off x="6305748" y="2906339"/>
+              <a:ext cx="357790" cy="307777"/>
+            </a:xfrm>
+            <a:prstGeom prst="rect">
+              <a:avLst/>
+            </a:prstGeom>
+            <a:noFill/>
+          </p:spPr>
+          <p:txBody>
+            <a:bodyPr wrap="none" rtlCol="0">
+              <a:spAutoFit/>
+            </a:bodyPr>
+            <a:lstStyle/>
+            <a:p>
+              <a:r>
+                <a:rPr lang="en-US" sz="1400" dirty="0" smtClean="0"/>
+                <a:t>3I</a:t>
+              </a:r>
+              <a:r>
+                <a:rPr lang="en-US" sz="1400" baseline="30000" dirty="0" smtClean="0"/>
+                <a:t>-</a:t>
+              </a:r>
+              <a:endParaRPr lang="en-US" sz="1400" baseline="30000" dirty="0"/>
+            </a:p>
+          </p:txBody>
+        </p:sp>
+        <p:sp>
+          <p:nvSpPr>
+            <p:cNvPr id="29" name="TextBox 28"/>
+            <p:cNvSpPr txBox="1"/>
+            <p:nvPr/>
+          </p:nvSpPr>
+          <p:spPr>
+            <a:xfrm>
+              <a:off x="1700411" y="2288392"/>
+              <a:ext cx="276038" cy="307777"/>
+            </a:xfrm>
+            <a:prstGeom prst="rect">
+              <a:avLst/>
+            </a:prstGeom>
+            <a:noFill/>
+          </p:spPr>
+          <p:txBody>
+            <a:bodyPr wrap="none" rtlCol="0">
+              <a:spAutoFit/>
+            </a:bodyPr>
+            <a:lstStyle/>
+            <a:p>
+              <a:r>
+                <a:rPr lang="en-US" sz="1400" dirty="0"/>
+                <a:t>3</a:t>
+              </a:r>
+              <a:endParaRPr lang="en-US" sz="1400" baseline="30000" dirty="0"/>
+            </a:p>
+          </p:txBody>
+        </p:sp>
+        <p:sp>
+          <p:nvSpPr>
+            <p:cNvPr id="30" name="TextBox 29"/>
+            <p:cNvSpPr txBox="1"/>
+            <p:nvPr/>
+          </p:nvSpPr>
+          <p:spPr>
+            <a:xfrm>
+              <a:off x="1785269" y="3262229"/>
+              <a:ext cx="276038" cy="307777"/>
+            </a:xfrm>
+            <a:prstGeom prst="rect">
+              <a:avLst/>
+            </a:prstGeom>
+            <a:noFill/>
+          </p:spPr>
+          <p:txBody>
+            <a:bodyPr wrap="none" rtlCol="0">
+              <a:spAutoFit/>
+            </a:bodyPr>
+            <a:lstStyle/>
+            <a:p>
+              <a:r>
+                <a:rPr lang="en-US" sz="1400" dirty="0"/>
+                <a:t>4</a:t>
+              </a:r>
+              <a:endParaRPr lang="en-US" sz="1400" baseline="30000" dirty="0"/>
+            </a:p>
+          </p:txBody>
+        </p:sp>
+        <p:sp>
+          <p:nvSpPr>
+            <p:cNvPr id="31" name="TextBox 30"/>
+            <p:cNvSpPr txBox="1"/>
+            <p:nvPr/>
+          </p:nvSpPr>
+          <p:spPr>
+            <a:xfrm>
+              <a:off x="2629192" y="3243868"/>
+              <a:ext cx="276038" cy="307777"/>
+            </a:xfrm>
+            <a:prstGeom prst="rect">
+              <a:avLst/>
+            </a:prstGeom>
+            <a:noFill/>
+          </p:spPr>
+          <p:txBody>
+            <a:bodyPr wrap="none" rtlCol="0">
+              <a:spAutoFit/>
+            </a:bodyPr>
+            <a:lstStyle/>
+            <a:p>
+              <a:r>
+                <a:rPr lang="en-US" sz="1400" dirty="0"/>
+                <a:t>6</a:t>
+              </a:r>
+              <a:endParaRPr lang="en-US" sz="1400" dirty="0"/>
+            </a:p>
+          </p:txBody>
+        </p:sp>
+        <p:sp>
+          <p:nvSpPr>
+            <p:cNvPr id="32" name="TextBox 31"/>
+            <p:cNvSpPr txBox="1"/>
+            <p:nvPr/>
+          </p:nvSpPr>
+          <p:spPr>
+            <a:xfrm>
+              <a:off x="3637248" y="2317384"/>
+              <a:ext cx="276038" cy="307777"/>
+            </a:xfrm>
+            <a:prstGeom prst="rect">
+              <a:avLst/>
+            </a:prstGeom>
+            <a:noFill/>
+          </p:spPr>
+          <p:txBody>
+            <a:bodyPr wrap="none" rtlCol="0">
+              <a:spAutoFit/>
+            </a:bodyPr>
+            <a:lstStyle/>
+            <a:p>
+              <a:r>
+                <a:rPr lang="en-US" sz="1400" dirty="0" smtClean="0"/>
+                <a:t>7</a:t>
+              </a:r>
+              <a:endParaRPr lang="en-US" sz="1400" baseline="30000" dirty="0"/>
+            </a:p>
+          </p:txBody>
+        </p:sp>
+        <p:sp>
+          <p:nvSpPr>
+            <p:cNvPr id="33" name="TextBox 32"/>
+            <p:cNvSpPr txBox="1"/>
+            <p:nvPr/>
+          </p:nvSpPr>
+          <p:spPr>
+            <a:xfrm>
+              <a:off x="3640904" y="3242381"/>
+              <a:ext cx="276038" cy="307777"/>
+            </a:xfrm>
+            <a:prstGeom prst="rect">
+              <a:avLst/>
+            </a:prstGeom>
+            <a:noFill/>
+          </p:spPr>
+          <p:txBody>
+            <a:bodyPr wrap="none" rtlCol="0">
+              <a:spAutoFit/>
+            </a:bodyPr>
+            <a:lstStyle/>
+            <a:p>
+              <a:r>
+                <a:rPr lang="en-US" sz="1400" dirty="0" smtClean="0"/>
+                <a:t>8</a:t>
+              </a:r>
+              <a:endParaRPr lang="en-US" sz="1400" baseline="30000" dirty="0"/>
+            </a:p>
+          </p:txBody>
+        </p:sp>
+        <p:sp>
+          <p:nvSpPr>
+            <p:cNvPr id="34" name="TextBox 33"/>
+            <p:cNvSpPr txBox="1"/>
+            <p:nvPr/>
+          </p:nvSpPr>
+          <p:spPr>
+            <a:xfrm>
+              <a:off x="4494595" y="2317383"/>
+              <a:ext cx="276038" cy="307777"/>
+            </a:xfrm>
+            <a:prstGeom prst="rect">
+              <a:avLst/>
+            </a:prstGeom>
+            <a:noFill/>
+          </p:spPr>
+          <p:txBody>
+            <a:bodyPr wrap="none" rtlCol="0">
+              <a:spAutoFit/>
+            </a:bodyPr>
+            <a:lstStyle/>
+            <a:p>
+              <a:r>
+                <a:rPr lang="en-US" sz="1400" dirty="0"/>
+                <a:t>9</a:t>
+              </a:r>
+            </a:p>
+          </p:txBody>
+        </p:sp>
+        <p:sp>
+          <p:nvSpPr>
+            <p:cNvPr id="35" name="TextBox 34"/>
+            <p:cNvSpPr txBox="1"/>
+            <p:nvPr/>
+          </p:nvSpPr>
+          <p:spPr>
+            <a:xfrm>
+              <a:off x="4474886" y="3242966"/>
+              <a:ext cx="367408" cy="307777"/>
+            </a:xfrm>
+            <a:prstGeom prst="rect">
+              <a:avLst/>
+            </a:prstGeom>
+            <a:noFill/>
+          </p:spPr>
+          <p:txBody>
+            <a:bodyPr wrap="none" rtlCol="0">
+              <a:spAutoFit/>
+            </a:bodyPr>
+            <a:lstStyle/>
+            <a:p>
+              <a:r>
+                <a:rPr lang="en-US" sz="1400" dirty="0" smtClean="0"/>
+                <a:t>10</a:t>
+              </a:r>
+              <a:endParaRPr lang="en-US" sz="1400" baseline="30000" dirty="0"/>
+            </a:p>
+          </p:txBody>
+        </p:sp>
+        <p:sp>
+          <p:nvSpPr>
+            <p:cNvPr id="36" name="TextBox 35"/>
+            <p:cNvSpPr txBox="1"/>
+            <p:nvPr/>
+          </p:nvSpPr>
+          <p:spPr>
+            <a:xfrm>
+              <a:off x="2633860" y="2279975"/>
+              <a:ext cx="276038" cy="307777"/>
+            </a:xfrm>
+            <a:prstGeom prst="rect">
+              <a:avLst/>
+            </a:prstGeom>
+            <a:noFill/>
+          </p:spPr>
+          <p:txBody>
+            <a:bodyPr wrap="none" rtlCol="0">
+              <a:spAutoFit/>
+            </a:bodyPr>
+            <a:lstStyle/>
+            <a:p>
+              <a:r>
+                <a:rPr lang="en-US" sz="1400" dirty="0" smtClean="0"/>
+                <a:t>5</a:t>
+              </a:r>
+              <a:endParaRPr lang="en-US" sz="1400" dirty="0"/>
+            </a:p>
+          </p:txBody>
+        </p:sp>
+        <p:sp>
+          <p:nvSpPr>
+            <p:cNvPr id="37" name="TextBox 36"/>
+            <p:cNvSpPr txBox="1"/>
+            <p:nvPr/>
+          </p:nvSpPr>
+          <p:spPr>
+            <a:xfrm>
+              <a:off x="5452467" y="3266835"/>
+              <a:ext cx="367408" cy="307777"/>
+            </a:xfrm>
+            <a:prstGeom prst="rect">
+              <a:avLst/>
+            </a:prstGeom>
+            <a:noFill/>
+          </p:spPr>
+          <p:txBody>
+            <a:bodyPr wrap="none" rtlCol="0">
+              <a:spAutoFit/>
+            </a:bodyPr>
+            <a:lstStyle/>
+            <a:p>
+              <a:r>
+                <a:rPr lang="en-US" sz="1400" dirty="0" smtClean="0"/>
+                <a:t>12</a:t>
+              </a:r>
+              <a:endParaRPr lang="en-US" sz="1400" baseline="30000" dirty="0"/>
+            </a:p>
+          </p:txBody>
+        </p:sp>
+        <p:sp>
+          <p:nvSpPr>
+            <p:cNvPr id="38" name="TextBox 37"/>
+            <p:cNvSpPr txBox="1"/>
+            <p:nvPr/>
+          </p:nvSpPr>
+          <p:spPr>
+            <a:xfrm>
+              <a:off x="5398646" y="2290783"/>
+              <a:ext cx="367408" cy="307777"/>
+            </a:xfrm>
+            <a:prstGeom prst="rect">
+              <a:avLst/>
+            </a:prstGeom>
+            <a:noFill/>
+          </p:spPr>
+          <p:txBody>
+            <a:bodyPr wrap="none" rtlCol="0">
+              <a:spAutoFit/>
+            </a:bodyPr>
+            <a:lstStyle/>
+            <a:p>
+              <a:r>
+                <a:rPr lang="en-US" sz="1400" dirty="0" smtClean="0"/>
+                <a:t>11</a:t>
+              </a:r>
+              <a:endParaRPr lang="en-US" sz="1400" baseline="30000" dirty="0"/>
+            </a:p>
+          </p:txBody>
+        </p:sp>
+        <p:sp>
+          <p:nvSpPr>
+            <p:cNvPr id="39" name="TextBox 38"/>
+            <p:cNvSpPr txBox="1"/>
+            <p:nvPr/>
+          </p:nvSpPr>
+          <p:spPr>
+            <a:xfrm>
+              <a:off x="6305534" y="3263061"/>
+              <a:ext cx="367408" cy="307777"/>
+            </a:xfrm>
+            <a:prstGeom prst="rect">
+              <a:avLst/>
+            </a:prstGeom>
+            <a:noFill/>
+          </p:spPr>
+          <p:txBody>
+            <a:bodyPr wrap="none" rtlCol="0">
+              <a:spAutoFit/>
+            </a:bodyPr>
+            <a:lstStyle/>
+            <a:p>
+              <a:r>
+                <a:rPr lang="en-US" sz="1400" dirty="0" smtClean="0"/>
+                <a:t>14</a:t>
+              </a:r>
+              <a:endParaRPr lang="en-US" sz="1400" baseline="30000" dirty="0"/>
+            </a:p>
+          </p:txBody>
+        </p:sp>
+        <p:sp>
+          <p:nvSpPr>
+            <p:cNvPr id="40" name="TextBox 39"/>
+            <p:cNvSpPr txBox="1"/>
+            <p:nvPr/>
+          </p:nvSpPr>
+          <p:spPr>
+            <a:xfrm>
+              <a:off x="6293620" y="2295872"/>
+              <a:ext cx="367408" cy="307777"/>
+            </a:xfrm>
+            <a:prstGeom prst="rect">
+              <a:avLst/>
+            </a:prstGeom>
+            <a:noFill/>
+          </p:spPr>
+          <p:txBody>
+            <a:bodyPr wrap="none" rtlCol="0">
+              <a:spAutoFit/>
+            </a:bodyPr>
+            <a:lstStyle/>
+            <a:p>
+              <a:r>
+                <a:rPr lang="en-US" sz="1400" dirty="0" smtClean="0"/>
+                <a:t>13</a:t>
+              </a:r>
+              <a:endParaRPr lang="en-US" sz="1400" baseline="30000" dirty="0"/>
+            </a:p>
+          </p:txBody>
+        </p:sp>
+        <p:grpSp>
+          <p:nvGrpSpPr>
+            <p:cNvPr id="44" name="Group 43"/>
+            <p:cNvGrpSpPr/>
+            <p:nvPr/>
+          </p:nvGrpSpPr>
+          <p:grpSpPr>
+            <a:xfrm>
+              <a:off x="2157222" y="2194495"/>
+              <a:ext cx="356616" cy="324655"/>
+              <a:chOff x="2359152" y="630936"/>
+              <a:chExt cx="408059" cy="393192"/>
+            </a:xfrm>
+          </p:grpSpPr>
+          <p:sp>
+            <p:nvSpPr>
+              <p:cNvPr id="42" name="Isosceles Triangle 41"/>
+              <p:cNvSpPr/>
+              <p:nvPr/>
+            </p:nvSpPr>
+            <p:spPr>
+              <a:xfrm>
+                <a:off x="2359152" y="630936"/>
+                <a:ext cx="408059" cy="393192"/>
+              </a:xfrm>
+              <a:prstGeom prst="triangle">
+                <a:avLst/>
+              </a:prstGeom>
+              <a:noFill/>
+              <a:ln>
+                <a:solidFill>
+                  <a:schemeClr val="tx1"/>
+                </a:solidFill>
+              </a:ln>
+            </p:spPr>
+            <p:style>
+              <a:lnRef idx="2">
+                <a:schemeClr val="accent1">
+                  <a:shade val="50000"/>
+                </a:schemeClr>
+              </a:lnRef>
+              <a:fillRef idx="1">
+                <a:schemeClr val="accent1"/>
+              </a:fillRef>
+              <a:effectRef idx="0">
+                <a:schemeClr val="accent1"/>
+              </a:effectRef>
+              <a:fontRef idx="minor">
+                <a:schemeClr val="lt1"/>
+              </a:fontRef>
+            </p:style>
+            <p:txBody>
+              <a:bodyPr rtlCol="0" anchor="ctr"/>
+              <a:lstStyle/>
+              <a:p>
+                <a:pPr algn="ctr"/>
+                <a:endParaRPr lang="en-US" sz="1200"/>
+              </a:p>
+            </p:txBody>
+          </p:sp>
+          <p:sp>
+            <p:nvSpPr>
+              <p:cNvPr id="43" name="TextBox 42"/>
+              <p:cNvSpPr txBox="1"/>
+              <p:nvPr/>
+            </p:nvSpPr>
+            <p:spPr>
+              <a:xfrm>
+                <a:off x="2420162" y="699687"/>
+                <a:ext cx="276038" cy="307777"/>
+              </a:xfrm>
+              <a:prstGeom prst="rect">
+                <a:avLst/>
+              </a:prstGeom>
+              <a:noFill/>
+            </p:spPr>
+            <p:txBody>
+              <a:bodyPr wrap="none" rtlCol="0">
+                <a:spAutoFit/>
+              </a:bodyPr>
+              <a:lstStyle/>
+              <a:p>
+                <a:r>
+                  <a:rPr lang="en-US" sz="1400" dirty="0" smtClean="0"/>
+                  <a:t>1</a:t>
+                </a:r>
+                <a:endParaRPr lang="en-US" sz="1400" dirty="0"/>
+              </a:p>
+            </p:txBody>
+          </p:sp>
+        </p:grpSp>
+        <p:grpSp>
+          <p:nvGrpSpPr>
+            <p:cNvPr id="48" name="Group 47"/>
+            <p:cNvGrpSpPr/>
+            <p:nvPr/>
+          </p:nvGrpSpPr>
+          <p:grpSpPr>
+            <a:xfrm>
+              <a:off x="2215932" y="3172308"/>
+              <a:ext cx="356616" cy="364544"/>
+              <a:chOff x="2359152" y="630936"/>
+              <a:chExt cx="408059" cy="441502"/>
+            </a:xfrm>
+          </p:grpSpPr>
+          <p:sp>
+            <p:nvSpPr>
+              <p:cNvPr id="49" name="Isosceles Triangle 48"/>
+              <p:cNvSpPr/>
+              <p:nvPr/>
+            </p:nvSpPr>
+            <p:spPr>
+              <a:xfrm>
+                <a:off x="2359152" y="630936"/>
+                <a:ext cx="408059" cy="393192"/>
+              </a:xfrm>
+              <a:prstGeom prst="triangle">
+                <a:avLst/>
+              </a:prstGeom>
+              <a:noFill/>
+              <a:ln>
+                <a:solidFill>
+                  <a:schemeClr val="tx1"/>
+                </a:solidFill>
+              </a:ln>
+            </p:spPr>
+            <p:style>
+              <a:lnRef idx="2">
+                <a:schemeClr val="accent1">
+                  <a:shade val="50000"/>
+                </a:schemeClr>
+              </a:lnRef>
+              <a:fillRef idx="1">
+                <a:schemeClr val="accent1"/>
+              </a:fillRef>
+              <a:effectRef idx="0">
+                <a:schemeClr val="accent1"/>
+              </a:effectRef>
+              <a:fontRef idx="minor">
+                <a:schemeClr val="lt1"/>
+              </a:fontRef>
+            </p:style>
+            <p:txBody>
+              <a:bodyPr rtlCol="0" anchor="ctr"/>
+              <a:lstStyle/>
+              <a:p>
+                <a:pPr algn="ctr"/>
+                <a:endParaRPr lang="en-US" sz="1200"/>
+              </a:p>
+            </p:txBody>
+          </p:sp>
+          <p:sp>
+            <p:nvSpPr>
+              <p:cNvPr id="50" name="TextBox 49"/>
+              <p:cNvSpPr txBox="1"/>
+              <p:nvPr/>
+            </p:nvSpPr>
+            <p:spPr>
+              <a:xfrm>
+                <a:off x="2420162" y="699687"/>
+                <a:ext cx="315857" cy="372751"/>
+              </a:xfrm>
+              <a:prstGeom prst="rect">
+                <a:avLst/>
+              </a:prstGeom>
+              <a:noFill/>
+            </p:spPr>
+            <p:txBody>
+              <a:bodyPr wrap="none" rtlCol="0">
+                <a:spAutoFit/>
+              </a:bodyPr>
+              <a:lstStyle/>
+              <a:p>
+                <a:r>
+                  <a:rPr lang="en-US" sz="1400" dirty="0"/>
+                  <a:t>2</a:t>
+                </a:r>
+                <a:endParaRPr lang="en-US" sz="1400" dirty="0"/>
+              </a:p>
+            </p:txBody>
+          </p:sp>
+        </p:grpSp>
+        <p:grpSp>
+          <p:nvGrpSpPr>
+            <p:cNvPr id="51" name="Group 50"/>
+            <p:cNvGrpSpPr/>
+            <p:nvPr/>
+          </p:nvGrpSpPr>
+          <p:grpSpPr>
+            <a:xfrm>
+              <a:off x="3060649" y="3169418"/>
+              <a:ext cx="356616" cy="364544"/>
+              <a:chOff x="2359152" y="630936"/>
+              <a:chExt cx="408059" cy="441502"/>
+            </a:xfrm>
+          </p:grpSpPr>
+          <p:sp>
+            <p:nvSpPr>
+              <p:cNvPr id="52" name="Isosceles Triangle 51"/>
+              <p:cNvSpPr/>
+              <p:nvPr/>
+            </p:nvSpPr>
+            <p:spPr>
+              <a:xfrm>
+                <a:off x="2359152" y="630936"/>
+                <a:ext cx="408059" cy="393192"/>
+              </a:xfrm>
+              <a:prstGeom prst="triangle">
+                <a:avLst/>
+              </a:prstGeom>
+              <a:noFill/>
+              <a:ln>
+                <a:solidFill>
+                  <a:schemeClr val="tx1"/>
+                </a:solidFill>
+              </a:ln>
+            </p:spPr>
+            <p:style>
+              <a:lnRef idx="2">
+                <a:schemeClr val="accent1">
+                  <a:shade val="50000"/>
+                </a:schemeClr>
+              </a:lnRef>
+              <a:fillRef idx="1">
+                <a:schemeClr val="accent1"/>
+              </a:fillRef>
+              <a:effectRef idx="0">
+                <a:schemeClr val="accent1"/>
+              </a:effectRef>
+              <a:fontRef idx="minor">
+                <a:schemeClr val="lt1"/>
+              </a:fontRef>
+            </p:style>
+            <p:txBody>
+              <a:bodyPr rtlCol="0" anchor="ctr"/>
+              <a:lstStyle/>
+              <a:p>
+                <a:pPr algn="ctr"/>
+                <a:endParaRPr lang="en-US" sz="1200"/>
+              </a:p>
+            </p:txBody>
+          </p:sp>
+          <p:sp>
+            <p:nvSpPr>
+              <p:cNvPr id="53" name="TextBox 52"/>
+              <p:cNvSpPr txBox="1"/>
+              <p:nvPr/>
+            </p:nvSpPr>
+            <p:spPr>
+              <a:xfrm>
+                <a:off x="2420162" y="699687"/>
+                <a:ext cx="315857" cy="372751"/>
+              </a:xfrm>
+              <a:prstGeom prst="rect">
+                <a:avLst/>
+              </a:prstGeom>
+              <a:noFill/>
+            </p:spPr>
+            <p:txBody>
+              <a:bodyPr wrap="none" rtlCol="0">
+                <a:spAutoFit/>
+              </a:bodyPr>
+              <a:lstStyle/>
+              <a:p>
+                <a:r>
+                  <a:rPr lang="en-US" sz="1400" dirty="0"/>
+                  <a:t>4</a:t>
+                </a:r>
+                <a:endParaRPr lang="en-US" sz="1400" dirty="0"/>
+              </a:p>
+            </p:txBody>
+          </p:sp>
+        </p:grpSp>
+        <p:grpSp>
+          <p:nvGrpSpPr>
+            <p:cNvPr id="54" name="Group 53"/>
+            <p:cNvGrpSpPr/>
+            <p:nvPr/>
+          </p:nvGrpSpPr>
+          <p:grpSpPr>
+            <a:xfrm>
+              <a:off x="3022693" y="2208200"/>
+              <a:ext cx="356616" cy="364544"/>
+              <a:chOff x="2359152" y="630936"/>
+              <a:chExt cx="408059" cy="441502"/>
+            </a:xfrm>
+          </p:grpSpPr>
+          <p:sp>
+            <p:nvSpPr>
+              <p:cNvPr id="55" name="Isosceles Triangle 54"/>
+              <p:cNvSpPr/>
+              <p:nvPr/>
+            </p:nvSpPr>
+            <p:spPr>
+              <a:xfrm>
+                <a:off x="2359152" y="630936"/>
+                <a:ext cx="408059" cy="393192"/>
+              </a:xfrm>
+              <a:prstGeom prst="triangle">
+                <a:avLst/>
+              </a:prstGeom>
+              <a:noFill/>
+              <a:ln>
+                <a:solidFill>
+                  <a:schemeClr val="tx1"/>
+                </a:solidFill>
+              </a:ln>
+            </p:spPr>
+            <p:style>
+              <a:lnRef idx="2">
+                <a:schemeClr val="accent1">
+                  <a:shade val="50000"/>
+                </a:schemeClr>
+              </a:lnRef>
+              <a:fillRef idx="1">
+                <a:schemeClr val="accent1"/>
+              </a:fillRef>
+              <a:effectRef idx="0">
+                <a:schemeClr val="accent1"/>
+              </a:effectRef>
+              <a:fontRef idx="minor">
+                <a:schemeClr val="lt1"/>
+              </a:fontRef>
+            </p:style>
+            <p:txBody>
+              <a:bodyPr rtlCol="0" anchor="ctr"/>
+              <a:lstStyle/>
+              <a:p>
+                <a:pPr algn="ctr"/>
+                <a:endParaRPr lang="en-US" sz="1200"/>
+              </a:p>
+            </p:txBody>
+          </p:sp>
+          <p:sp>
+            <p:nvSpPr>
+              <p:cNvPr id="56" name="TextBox 55"/>
+              <p:cNvSpPr txBox="1"/>
+              <p:nvPr/>
+            </p:nvSpPr>
+            <p:spPr>
+              <a:xfrm>
+                <a:off x="2420162" y="699687"/>
+                <a:ext cx="315857" cy="372751"/>
+              </a:xfrm>
+              <a:prstGeom prst="rect">
+                <a:avLst/>
+              </a:prstGeom>
+              <a:noFill/>
+            </p:spPr>
+            <p:txBody>
+              <a:bodyPr wrap="none" rtlCol="0">
+                <a:spAutoFit/>
+              </a:bodyPr>
+              <a:lstStyle/>
+              <a:p>
+                <a:r>
+                  <a:rPr lang="en-US" sz="1400" dirty="0"/>
+                  <a:t>3</a:t>
+                </a:r>
+                <a:endParaRPr lang="en-US" sz="1400" dirty="0"/>
+              </a:p>
+            </p:txBody>
+          </p:sp>
+        </p:grpSp>
+        <p:grpSp>
+          <p:nvGrpSpPr>
+            <p:cNvPr id="57" name="Group 56"/>
+            <p:cNvGrpSpPr/>
+            <p:nvPr/>
+          </p:nvGrpSpPr>
+          <p:grpSpPr>
+            <a:xfrm>
+              <a:off x="4884716" y="2263097"/>
+              <a:ext cx="356616" cy="364544"/>
+              <a:chOff x="2359152" y="630936"/>
+              <a:chExt cx="408059" cy="441502"/>
+            </a:xfrm>
+          </p:grpSpPr>
+          <p:sp>
+            <p:nvSpPr>
+              <p:cNvPr id="58" name="Isosceles Triangle 57"/>
+              <p:cNvSpPr/>
+              <p:nvPr/>
+            </p:nvSpPr>
+            <p:spPr>
+              <a:xfrm>
+                <a:off x="2359152" y="630936"/>
+                <a:ext cx="408059" cy="393192"/>
+              </a:xfrm>
+              <a:prstGeom prst="triangle">
+                <a:avLst/>
+              </a:prstGeom>
+              <a:noFill/>
+              <a:ln>
+                <a:solidFill>
+                  <a:schemeClr val="tx1"/>
+                </a:solidFill>
+              </a:ln>
+            </p:spPr>
+            <p:style>
+              <a:lnRef idx="2">
+                <a:schemeClr val="accent1">
+                  <a:shade val="50000"/>
+                </a:schemeClr>
+              </a:lnRef>
+              <a:fillRef idx="1">
+                <a:schemeClr val="accent1"/>
+              </a:fillRef>
+              <a:effectRef idx="0">
+                <a:schemeClr val="accent1"/>
+              </a:effectRef>
+              <a:fontRef idx="minor">
+                <a:schemeClr val="lt1"/>
+              </a:fontRef>
+            </p:style>
+            <p:txBody>
+              <a:bodyPr rtlCol="0" anchor="ctr"/>
+              <a:lstStyle/>
+              <a:p>
+                <a:pPr algn="ctr"/>
+                <a:endParaRPr lang="en-US" sz="1200"/>
+              </a:p>
+            </p:txBody>
+          </p:sp>
+          <p:sp>
+            <p:nvSpPr>
+              <p:cNvPr id="59" name="TextBox 58"/>
+              <p:cNvSpPr txBox="1"/>
+              <p:nvPr/>
+            </p:nvSpPr>
+            <p:spPr>
+              <a:xfrm>
+                <a:off x="2420162" y="699687"/>
+                <a:ext cx="315857" cy="372751"/>
+              </a:xfrm>
+              <a:prstGeom prst="rect">
+                <a:avLst/>
+              </a:prstGeom>
+              <a:noFill/>
+            </p:spPr>
+            <p:txBody>
+              <a:bodyPr wrap="none" rtlCol="0">
+                <a:spAutoFit/>
+              </a:bodyPr>
+              <a:lstStyle/>
+              <a:p>
+                <a:r>
+                  <a:rPr lang="en-US" sz="1400" dirty="0"/>
+                  <a:t>7</a:t>
+                </a:r>
+              </a:p>
+            </p:txBody>
+          </p:sp>
+        </p:grpSp>
+        <p:grpSp>
+          <p:nvGrpSpPr>
+            <p:cNvPr id="60" name="Group 59"/>
+            <p:cNvGrpSpPr/>
+            <p:nvPr/>
+          </p:nvGrpSpPr>
+          <p:grpSpPr>
+            <a:xfrm>
+              <a:off x="4113347" y="3169418"/>
+              <a:ext cx="356616" cy="364544"/>
+              <a:chOff x="2359152" y="630936"/>
+              <a:chExt cx="408059" cy="441502"/>
+            </a:xfrm>
+          </p:grpSpPr>
+          <p:sp>
+            <p:nvSpPr>
+              <p:cNvPr id="61" name="Isosceles Triangle 60"/>
+              <p:cNvSpPr/>
+              <p:nvPr/>
+            </p:nvSpPr>
+            <p:spPr>
+              <a:xfrm>
+                <a:off x="2359152" y="630936"/>
+                <a:ext cx="408059" cy="393192"/>
+              </a:xfrm>
+              <a:prstGeom prst="triangle">
+                <a:avLst/>
+              </a:prstGeom>
+              <a:noFill/>
+              <a:ln>
+                <a:solidFill>
+                  <a:schemeClr val="tx1"/>
+                </a:solidFill>
+              </a:ln>
+            </p:spPr>
+            <p:style>
+              <a:lnRef idx="2">
+                <a:schemeClr val="accent1">
+                  <a:shade val="50000"/>
+                </a:schemeClr>
+              </a:lnRef>
+              <a:fillRef idx="1">
+                <a:schemeClr val="accent1"/>
+              </a:fillRef>
+              <a:effectRef idx="0">
+                <a:schemeClr val="accent1"/>
+              </a:effectRef>
+              <a:fontRef idx="minor">
+                <a:schemeClr val="lt1"/>
+              </a:fontRef>
+            </p:style>
+            <p:txBody>
+              <a:bodyPr rtlCol="0" anchor="ctr"/>
+              <a:lstStyle/>
+              <a:p>
+                <a:pPr algn="ctr"/>
+                <a:endParaRPr lang="en-US" sz="1200"/>
+              </a:p>
+            </p:txBody>
+          </p:sp>
+          <p:sp>
+            <p:nvSpPr>
+              <p:cNvPr id="62" name="TextBox 61"/>
+              <p:cNvSpPr txBox="1"/>
+              <p:nvPr/>
+            </p:nvSpPr>
+            <p:spPr>
+              <a:xfrm>
+                <a:off x="2420162" y="699687"/>
+                <a:ext cx="315857" cy="372751"/>
+              </a:xfrm>
+              <a:prstGeom prst="rect">
+                <a:avLst/>
+              </a:prstGeom>
+              <a:noFill/>
+            </p:spPr>
+            <p:txBody>
+              <a:bodyPr wrap="none" rtlCol="0">
+                <a:spAutoFit/>
+              </a:bodyPr>
+              <a:lstStyle/>
+              <a:p>
+                <a:r>
+                  <a:rPr lang="en-US" sz="1400" dirty="0"/>
+                  <a:t>6</a:t>
+                </a:r>
+                <a:endParaRPr lang="en-US" sz="1400" dirty="0"/>
+              </a:p>
+            </p:txBody>
+          </p:sp>
+        </p:grpSp>
+        <p:grpSp>
+          <p:nvGrpSpPr>
+            <p:cNvPr id="63" name="Group 62"/>
+            <p:cNvGrpSpPr/>
+            <p:nvPr/>
+          </p:nvGrpSpPr>
+          <p:grpSpPr>
+            <a:xfrm>
+              <a:off x="4065266" y="2227608"/>
+              <a:ext cx="356616" cy="364544"/>
+              <a:chOff x="2359152" y="630936"/>
+              <a:chExt cx="408059" cy="441502"/>
+            </a:xfrm>
+          </p:grpSpPr>
+          <p:sp>
+            <p:nvSpPr>
+              <p:cNvPr id="64" name="Isosceles Triangle 63"/>
+              <p:cNvSpPr/>
+              <p:nvPr/>
+            </p:nvSpPr>
+            <p:spPr>
+              <a:xfrm>
+                <a:off x="2359152" y="630936"/>
+                <a:ext cx="408059" cy="393192"/>
+              </a:xfrm>
+              <a:prstGeom prst="triangle">
+                <a:avLst/>
+              </a:prstGeom>
+              <a:noFill/>
+              <a:ln>
+                <a:solidFill>
+                  <a:schemeClr val="tx1"/>
+                </a:solidFill>
+              </a:ln>
+            </p:spPr>
+            <p:style>
+              <a:lnRef idx="2">
+                <a:schemeClr val="accent1">
+                  <a:shade val="50000"/>
+                </a:schemeClr>
+              </a:lnRef>
+              <a:fillRef idx="1">
+                <a:schemeClr val="accent1"/>
+              </a:fillRef>
+              <a:effectRef idx="0">
+                <a:schemeClr val="accent1"/>
+              </a:effectRef>
+              <a:fontRef idx="minor">
+                <a:schemeClr val="lt1"/>
+              </a:fontRef>
+            </p:style>
+            <p:txBody>
+              <a:bodyPr rtlCol="0" anchor="ctr"/>
+              <a:lstStyle/>
+              <a:p>
+                <a:pPr algn="ctr"/>
+                <a:endParaRPr lang="en-US" sz="1200"/>
+              </a:p>
+            </p:txBody>
+          </p:sp>
+          <p:sp>
+            <p:nvSpPr>
+              <p:cNvPr id="65" name="TextBox 64"/>
+              <p:cNvSpPr txBox="1"/>
+              <p:nvPr/>
+            </p:nvSpPr>
+            <p:spPr>
+              <a:xfrm>
+                <a:off x="2420162" y="699687"/>
+                <a:ext cx="315857" cy="372751"/>
+              </a:xfrm>
+              <a:prstGeom prst="rect">
+                <a:avLst/>
+              </a:prstGeom>
+              <a:noFill/>
+            </p:spPr>
+            <p:txBody>
+              <a:bodyPr wrap="none" rtlCol="0">
+                <a:spAutoFit/>
+              </a:bodyPr>
+              <a:lstStyle/>
+              <a:p>
+                <a:r>
+                  <a:rPr lang="en-US" sz="1400" dirty="0"/>
+                  <a:t>5</a:t>
+                </a:r>
+                <a:endParaRPr lang="en-US" sz="1400" dirty="0"/>
+              </a:p>
+            </p:txBody>
+          </p:sp>
+        </p:grpSp>
+        <p:grpSp>
+          <p:nvGrpSpPr>
+            <p:cNvPr id="66" name="Group 65"/>
+            <p:cNvGrpSpPr/>
+            <p:nvPr/>
+          </p:nvGrpSpPr>
+          <p:grpSpPr>
+            <a:xfrm>
+              <a:off x="4936721" y="3194084"/>
+              <a:ext cx="356616" cy="364544"/>
+              <a:chOff x="2359152" y="630936"/>
+              <a:chExt cx="408059" cy="441502"/>
+            </a:xfrm>
+          </p:grpSpPr>
+          <p:sp>
+            <p:nvSpPr>
+              <p:cNvPr id="67" name="Isosceles Triangle 66"/>
+              <p:cNvSpPr/>
+              <p:nvPr/>
+            </p:nvSpPr>
+            <p:spPr>
+              <a:xfrm>
+                <a:off x="2359152" y="630936"/>
+                <a:ext cx="408059" cy="393192"/>
+              </a:xfrm>
+              <a:prstGeom prst="triangle">
+                <a:avLst/>
+              </a:prstGeom>
+              <a:noFill/>
+              <a:ln>
+                <a:solidFill>
+                  <a:schemeClr val="tx1"/>
+                </a:solidFill>
+              </a:ln>
+            </p:spPr>
+            <p:style>
+              <a:lnRef idx="2">
+                <a:schemeClr val="accent1">
+                  <a:shade val="50000"/>
+                </a:schemeClr>
+              </a:lnRef>
+              <a:fillRef idx="1">
+                <a:schemeClr val="accent1"/>
+              </a:fillRef>
+              <a:effectRef idx="0">
+                <a:schemeClr val="accent1"/>
+              </a:effectRef>
+              <a:fontRef idx="minor">
+                <a:schemeClr val="lt1"/>
+              </a:fontRef>
+            </p:style>
+            <p:txBody>
+              <a:bodyPr rtlCol="0" anchor="ctr"/>
+              <a:lstStyle/>
+              <a:p>
+                <a:pPr algn="ctr"/>
+                <a:endParaRPr lang="en-US" sz="1200"/>
+              </a:p>
+            </p:txBody>
+          </p:sp>
+          <p:sp>
+            <p:nvSpPr>
+              <p:cNvPr id="68" name="TextBox 67"/>
+              <p:cNvSpPr txBox="1"/>
+              <p:nvPr/>
+            </p:nvSpPr>
+            <p:spPr>
+              <a:xfrm>
+                <a:off x="2420162" y="699687"/>
+                <a:ext cx="315857" cy="372751"/>
+              </a:xfrm>
+              <a:prstGeom prst="rect">
+                <a:avLst/>
+              </a:prstGeom>
+              <a:noFill/>
+            </p:spPr>
+            <p:txBody>
+              <a:bodyPr wrap="none" rtlCol="0">
+                <a:spAutoFit/>
+              </a:bodyPr>
+              <a:lstStyle/>
+              <a:p>
+                <a:r>
+                  <a:rPr lang="en-US" sz="1400" dirty="0" smtClean="0"/>
+                  <a:t>8</a:t>
+                </a:r>
+                <a:endParaRPr lang="en-US" sz="1400" dirty="0"/>
+              </a:p>
+            </p:txBody>
+          </p:sp>
+        </p:grpSp>
+      </p:grpSp>
+      <p:grpSp>
+        <p:nvGrpSpPr>
+          <p:cNvPr id="81" name="Group 80"/>
+          <p:cNvGrpSpPr/>
+          <p:nvPr/>
+        </p:nvGrpSpPr>
+        <p:grpSpPr>
+          <a:xfrm>
+            <a:off x="7489085" y="1959935"/>
+            <a:ext cx="2844370" cy="1751834"/>
+            <a:chOff x="7739981" y="1960821"/>
+            <a:chExt cx="2844370" cy="1751834"/>
+          </a:xfrm>
+        </p:grpSpPr>
+        <p:grpSp>
+          <p:nvGrpSpPr>
+            <p:cNvPr id="76" name="Group 75"/>
+            <p:cNvGrpSpPr/>
+            <p:nvPr/>
+          </p:nvGrpSpPr>
+          <p:grpSpPr>
+            <a:xfrm>
+              <a:off x="8491289" y="2597566"/>
+              <a:ext cx="894378" cy="682680"/>
+              <a:chOff x="7831786" y="3097702"/>
+              <a:chExt cx="894378" cy="682680"/>
+            </a:xfrm>
+          </p:grpSpPr>
+          <p:sp>
+            <p:nvSpPr>
+              <p:cNvPr id="69" name="TextBox 68"/>
+              <p:cNvSpPr txBox="1"/>
+              <p:nvPr/>
+            </p:nvSpPr>
+            <p:spPr>
+              <a:xfrm>
+                <a:off x="7831786" y="3097702"/>
+                <a:ext cx="437940" cy="307777"/>
+              </a:xfrm>
+              <a:prstGeom prst="rect">
+                <a:avLst/>
+              </a:prstGeom>
+              <a:noFill/>
+            </p:spPr>
+            <p:txBody>
+              <a:bodyPr wrap="none" rtlCol="0">
+                <a:spAutoFit/>
+              </a:bodyPr>
+              <a:lstStyle/>
+              <a:p>
+                <a:r>
+                  <a:rPr lang="en-US" sz="1400" dirty="0" smtClean="0"/>
+                  <a:t>1V</a:t>
+                </a:r>
+                <a:r>
+                  <a:rPr lang="en-US" sz="1400" baseline="30000" dirty="0" smtClean="0"/>
+                  <a:t>+</a:t>
+                </a:r>
+                <a:endParaRPr lang="en-US" sz="1400" baseline="30000" dirty="0"/>
+              </a:p>
+            </p:txBody>
+          </p:sp>
+          <p:sp>
+            <p:nvSpPr>
+              <p:cNvPr id="70" name="TextBox 69"/>
+              <p:cNvSpPr txBox="1"/>
+              <p:nvPr/>
+            </p:nvSpPr>
+            <p:spPr>
+              <a:xfrm>
+                <a:off x="7912737" y="3472605"/>
+                <a:ext cx="276038" cy="307777"/>
+              </a:xfrm>
+              <a:prstGeom prst="rect">
+                <a:avLst/>
+              </a:prstGeom>
+              <a:noFill/>
+            </p:spPr>
+            <p:txBody>
+              <a:bodyPr wrap="none" rtlCol="0">
+                <a:spAutoFit/>
+              </a:bodyPr>
+              <a:lstStyle/>
+              <a:p>
+                <a:r>
+                  <a:rPr lang="en-US" sz="1400" dirty="0"/>
+                  <a:t>3</a:t>
+                </a:r>
+                <a:endParaRPr lang="en-US" sz="1400" baseline="30000" dirty="0"/>
+              </a:p>
+            </p:txBody>
+          </p:sp>
+          <p:grpSp>
+            <p:nvGrpSpPr>
+              <p:cNvPr id="71" name="Group 70"/>
+              <p:cNvGrpSpPr/>
+              <p:nvPr/>
+            </p:nvGrpSpPr>
+            <p:grpSpPr>
+              <a:xfrm>
+                <a:off x="8369548" y="3378708"/>
+                <a:ext cx="356616" cy="324655"/>
+                <a:chOff x="2359152" y="630936"/>
+                <a:chExt cx="408059" cy="393192"/>
+              </a:xfrm>
+            </p:grpSpPr>
+            <p:sp>
+              <p:nvSpPr>
+                <p:cNvPr id="72" name="Isosceles Triangle 71"/>
+                <p:cNvSpPr/>
+                <p:nvPr/>
+              </p:nvSpPr>
+              <p:spPr>
+                <a:xfrm>
+                  <a:off x="2359152" y="630936"/>
+                  <a:ext cx="408059" cy="393192"/>
+                </a:xfrm>
+                <a:prstGeom prst="triangle">
+                  <a:avLst/>
+                </a:prstGeom>
+                <a:noFill/>
+                <a:ln>
+                  <a:solidFill>
+                    <a:schemeClr val="tx1"/>
+                  </a:solidFill>
+                </a:ln>
+              </p:spPr>
+              <p:style>
+                <a:lnRef idx="2">
+                  <a:schemeClr val="accent1">
+                    <a:shade val="50000"/>
+                  </a:schemeClr>
+                </a:lnRef>
+                <a:fillRef idx="1">
+                  <a:schemeClr val="accent1"/>
+                </a:fillRef>
+                <a:effectRef idx="0">
+                  <a:schemeClr val="accent1"/>
+                </a:effectRef>
+                <a:fontRef idx="minor">
+                  <a:schemeClr val="lt1"/>
+                </a:fontRef>
+              </p:style>
+              <p:txBody>
+                <a:bodyPr rtlCol="0" anchor="ctr"/>
+                <a:lstStyle/>
+                <a:p>
+                  <a:pPr algn="ctr"/>
+                  <a:endParaRPr lang="en-US" sz="1200"/>
+                </a:p>
+              </p:txBody>
+            </p:sp>
+            <p:sp>
+              <p:nvSpPr>
+                <p:cNvPr id="73" name="TextBox 72"/>
+                <p:cNvSpPr txBox="1"/>
+                <p:nvPr/>
+              </p:nvSpPr>
+              <p:spPr>
+                <a:xfrm>
+                  <a:off x="2420162" y="699687"/>
+                  <a:ext cx="276038" cy="307777"/>
+                </a:xfrm>
+                <a:prstGeom prst="rect">
+                  <a:avLst/>
+                </a:prstGeom>
+                <a:noFill/>
+              </p:spPr>
+              <p:txBody>
+                <a:bodyPr wrap="none" rtlCol="0">
+                  <a:spAutoFit/>
+                </a:bodyPr>
+                <a:lstStyle/>
+                <a:p>
+                  <a:r>
+                    <a:rPr lang="en-US" sz="1400" dirty="0" smtClean="0"/>
+                    <a:t>1</a:t>
+                  </a:r>
+                  <a:endParaRPr lang="en-US" sz="1400" dirty="0"/>
+                </a:p>
+              </p:txBody>
+            </p:sp>
+          </p:grpSp>
+          <p:sp>
+            <p:nvSpPr>
+              <p:cNvPr id="74" name="Oval 73"/>
+              <p:cNvSpPr/>
+              <p:nvPr/>
+            </p:nvSpPr>
+            <p:spPr>
+              <a:xfrm>
+                <a:off x="8102985" y="3271610"/>
+                <a:ext cx="329184" cy="329184"/>
+              </a:xfrm>
+              <a:prstGeom prst="ellipse">
+                <a:avLst/>
+              </a:prstGeom>
+              <a:solidFill>
+                <a:schemeClr val="bg1">
+                  <a:lumMod val="50000"/>
+                </a:schemeClr>
+              </a:solidFill>
+              <a:ln>
+                <a:solidFill>
+                  <a:schemeClr val="bg2">
+                    <a:lumMod val="25000"/>
+                  </a:schemeClr>
+                </a:solidFill>
+              </a:ln>
+            </p:spPr>
+            <p:style>
+              <a:lnRef idx="2">
+                <a:schemeClr val="accent1">
+                  <a:shade val="50000"/>
+                </a:schemeClr>
+              </a:lnRef>
+              <a:fillRef idx="1">
+                <a:schemeClr val="accent1"/>
+              </a:fillRef>
+              <a:effectRef idx="0">
+                <a:schemeClr val="accent1"/>
+              </a:effectRef>
+              <a:fontRef idx="minor">
+                <a:schemeClr val="lt1"/>
+              </a:fontRef>
+            </p:style>
+            <p:txBody>
+              <a:bodyPr rtlCol="0" anchor="ctr"/>
+              <a:lstStyle/>
+              <a:p>
+                <a:pPr algn="ctr"/>
+                <a:endParaRPr lang="en-US"/>
+              </a:p>
+            </p:txBody>
+          </p:sp>
+        </p:grpSp>
+        <p:sp>
+          <p:nvSpPr>
+            <p:cNvPr id="75" name="TextBox 74"/>
+            <p:cNvSpPr txBox="1"/>
+            <p:nvPr/>
+          </p:nvSpPr>
+          <p:spPr>
+            <a:xfrm>
+              <a:off x="7801538" y="1960821"/>
+              <a:ext cx="1198684" cy="738664"/>
+            </a:xfrm>
+            <a:prstGeom prst="rect">
+              <a:avLst/>
+            </a:prstGeom>
+            <a:noFill/>
+          </p:spPr>
+          <p:txBody>
+            <a:bodyPr wrap="square" rtlCol="0">
+              <a:spAutoFit/>
+            </a:bodyPr>
+            <a:lstStyle/>
+            <a:p>
+              <a:r>
+                <a:rPr lang="en-US" sz="1400" dirty="0" smtClean="0"/>
+                <a:t>Marking on mount next to pad</a:t>
+              </a:r>
+              <a:endParaRPr lang="en-US" sz="1400" dirty="0"/>
+            </a:p>
+          </p:txBody>
+        </p:sp>
+        <p:sp>
+          <p:nvSpPr>
+            <p:cNvPr id="77" name="TextBox 76"/>
+            <p:cNvSpPr txBox="1"/>
+            <p:nvPr/>
+          </p:nvSpPr>
+          <p:spPr>
+            <a:xfrm>
+              <a:off x="7739981" y="3189435"/>
+              <a:ext cx="1198684" cy="523220"/>
+            </a:xfrm>
+            <a:prstGeom prst="rect">
+              <a:avLst/>
+            </a:prstGeom>
+            <a:noFill/>
+          </p:spPr>
+          <p:txBody>
+            <a:bodyPr wrap="square" rtlCol="0">
+              <a:spAutoFit/>
+            </a:bodyPr>
+            <a:lstStyle/>
+            <a:p>
+              <a:r>
+                <a:rPr lang="en-US" sz="1400" dirty="0" smtClean="0"/>
+                <a:t>Break-out box number</a:t>
+              </a:r>
+              <a:endParaRPr lang="en-US" sz="1400" dirty="0"/>
+            </a:p>
+          </p:txBody>
+        </p:sp>
+        <p:sp>
+          <p:nvSpPr>
+            <p:cNvPr id="79" name="TextBox 78"/>
+            <p:cNvSpPr txBox="1"/>
+            <p:nvPr/>
+          </p:nvSpPr>
+          <p:spPr>
+            <a:xfrm>
+              <a:off x="9385667" y="3189435"/>
+              <a:ext cx="1198684" cy="523220"/>
+            </a:xfrm>
+            <a:prstGeom prst="rect">
+              <a:avLst/>
+            </a:prstGeom>
+            <a:noFill/>
+          </p:spPr>
+          <p:txBody>
+            <a:bodyPr wrap="square" rtlCol="0">
+              <a:spAutoFit/>
+            </a:bodyPr>
+            <a:lstStyle/>
+            <a:p>
+              <a:r>
+                <a:rPr lang="en-US" sz="1400" dirty="0" smtClean="0"/>
+                <a:t>Switch Matrix pin number</a:t>
+              </a:r>
+              <a:endParaRPr lang="en-US" sz="1400" dirty="0"/>
+            </a:p>
+          </p:txBody>
+        </p:sp>
+      </p:grpSp>
+      <p:sp>
+        <p:nvSpPr>
+          <p:cNvPr id="80" name="TextBox 79"/>
+          <p:cNvSpPr txBox="1"/>
+          <p:nvPr/>
+        </p:nvSpPr>
+        <p:spPr>
+          <a:xfrm>
+            <a:off x="3551892" y="1167420"/>
+            <a:ext cx="1836144" cy="461665"/>
+          </a:xfrm>
+          <a:prstGeom prst="rect">
+            <a:avLst/>
+          </a:prstGeom>
+          <a:noFill/>
+        </p:spPr>
+        <p:txBody>
+          <a:bodyPr wrap="none" rtlCol="0">
+            <a:spAutoFit/>
+          </a:bodyPr>
+          <a:lstStyle/>
+          <a:p>
+            <a:r>
+              <a:rPr lang="en-US" sz="2400" dirty="0" smtClean="0"/>
+              <a:t>Breakout Box</a:t>
+            </a:r>
+            <a:endParaRPr lang="en-US" sz="2400" dirty="0"/>
+          </a:p>
+        </p:txBody>
+      </p:sp>
+      <p:sp>
+        <p:nvSpPr>
+          <p:cNvPr id="83" name="TextBox 82"/>
+          <p:cNvSpPr txBox="1"/>
+          <p:nvPr/>
+        </p:nvSpPr>
+        <p:spPr>
+          <a:xfrm>
+            <a:off x="1585660" y="3851753"/>
+            <a:ext cx="6041618" cy="830997"/>
+          </a:xfrm>
+          <a:prstGeom prst="rect">
+            <a:avLst/>
+          </a:prstGeom>
+          <a:noFill/>
+        </p:spPr>
+        <p:txBody>
+          <a:bodyPr wrap="square" rtlCol="0">
+            <a:spAutoFit/>
+          </a:bodyPr>
+          <a:lstStyle/>
+          <a:p>
+            <a:r>
+              <a:rPr lang="en-US" sz="1600" dirty="0" smtClean="0"/>
+              <a:t>* At the moment, switch matrix 7 does not work. This has been resolved by physically connecting switch cable 9 to BB 9. In the software this is still SM pin 7.</a:t>
+            </a:r>
+            <a:endParaRPr lang="en-US" sz="1600" dirty="0"/>
+          </a:p>
+        </p:txBody>
+      </p:sp>
+      <p:sp>
+        <p:nvSpPr>
+          <p:cNvPr id="84" name="TextBox 83"/>
+          <p:cNvSpPr txBox="1"/>
+          <p:nvPr/>
+        </p:nvSpPr>
+        <p:spPr>
+          <a:xfrm>
+            <a:off x="854307" y="4815734"/>
+            <a:ext cx="9629946" cy="923330"/>
+          </a:xfrm>
+          <a:prstGeom prst="rect">
+            <a:avLst/>
+          </a:prstGeom>
+          <a:noFill/>
+        </p:spPr>
+        <p:txBody>
+          <a:bodyPr wrap="square" rtlCol="0">
+            <a:spAutoFit/>
+          </a:bodyPr>
+          <a:lstStyle/>
+          <a:p>
+            <a:pPr marL="342900" indent="-342900">
+              <a:buFont typeface="+mj-lt"/>
+              <a:buAutoNum type="arabicPeriod"/>
+            </a:pPr>
+            <a:r>
+              <a:rPr lang="en-US" dirty="0" smtClean="0"/>
+              <a:t>Plug the rotator option box into the PPMS and plug the breakout box cable into the option box.</a:t>
+            </a:r>
+          </a:p>
+          <a:p>
+            <a:pPr marL="342900" indent="-342900">
+              <a:buFont typeface="+mj-lt"/>
+              <a:buAutoNum type="arabicPeriod"/>
+            </a:pPr>
+            <a:r>
+              <a:rPr lang="en-US" dirty="0" smtClean="0"/>
+              <a:t>Make sure the breakout box is wired to the switch matrix according to the above diagram.</a:t>
+            </a:r>
+          </a:p>
+          <a:p>
+            <a:pPr marL="342900" indent="-342900">
+              <a:buFont typeface="+mj-lt"/>
+              <a:buAutoNum type="arabicPeriod"/>
+            </a:pPr>
+            <a:r>
+              <a:rPr lang="en-US" dirty="0" smtClean="0"/>
+              <a:t>Use the above diagram to check your work converting mount pins to switch pins.</a:t>
+            </a:r>
+            <a:endParaRPr lang="en-US" dirty="0"/>
+          </a:p>
+        </p:txBody>
+      </p:sp>
+    </p:spTree>
+    <p:extLst>
+      <p:ext uri="{BB962C8B-B14F-4D97-AF65-F5344CB8AC3E}">
+        <p14:creationId xmlns:p14="http://schemas.microsoft.com/office/powerpoint/2010/main" val="1527545742"/>
+      </p:ext>
+    </p:extLst>
+  </p:cSld>
+  <p:clrMapOvr>
+    <a:masterClrMapping/>
+  </p:clrMapOvr>
+</p:sld>
+</file>
+
+<file path=ppt/slides/slide3.xml><?xml version="1.0" encoding="utf-8"?>
 <p:sld xmlns:a="http://schemas.openxmlformats.org/drawingml/2006/main" xmlns:r="http://schemas.openxmlformats.org/officeDocument/2006/relationships" xmlns:p="http://schemas.openxmlformats.org/presentationml/2006/main">
   <p:cSld>
     <p:spTree>
@@ -4066,187 +6779,187 @@
       </p:grpSp>
       <p:grpSp>
         <p:nvGrpSpPr>
-          <p:cNvPr id="30" name="Group 29"/>
+          <p:cNvPr id="37" name="Group 36"/>
           <p:cNvGrpSpPr/>
           <p:nvPr/>
         </p:nvGrpSpPr>
         <p:grpSpPr>
           <a:xfrm>
             <a:off x="5488378" y="832890"/>
-            <a:ext cx="3711311" cy="5413969"/>
-            <a:chOff x="5505325" y="120056"/>
-            <a:chExt cx="3711311" cy="5413969"/>
+            <a:ext cx="3711311" cy="5411262"/>
+            <a:chOff x="5488378" y="832890"/>
+            <a:chExt cx="3711311" cy="5411262"/>
           </a:xfrm>
         </p:grpSpPr>
-        <p:sp>
-          <p:nvSpPr>
-            <p:cNvPr id="19" name="TextBox 18"/>
-            <p:cNvSpPr txBox="1"/>
+        <p:pic>
+          <p:nvPicPr>
+            <p:cNvPr id="22" name="Picture 21"/>
+            <p:cNvPicPr>
+              <a:picLocks noChangeAspect="1"/>
+            </p:cNvPicPr>
             <p:nvPr/>
-          </p:nvSpPr>
+          </p:nvPicPr>
+          <p:blipFill>
+            <a:blip r:embed="rId5"/>
+            <a:stretch>
+              <a:fillRect/>
+            </a:stretch>
+          </p:blipFill>
           <p:spPr>
             <a:xfrm>
-              <a:off x="5505325" y="194678"/>
-              <a:ext cx="3628463" cy="2308324"/>
+              <a:off x="5537434" y="2950793"/>
+              <a:ext cx="3522626" cy="3198080"/>
             </a:xfrm>
             <a:prstGeom prst="rect">
               <a:avLst/>
             </a:prstGeom>
-            <a:noFill/>
           </p:spPr>
-          <p:txBody>
-            <a:bodyPr wrap="square" rtlCol="0">
-              <a:spAutoFit/>
-            </a:bodyPr>
-            <a:lstStyle/>
-            <a:p>
-              <a:pPr algn="ctr"/>
-              <a:r>
-                <a:rPr lang="en-US" dirty="0" smtClean="0"/>
-                <a:t>Set Up The program</a:t>
-              </a:r>
-            </a:p>
-            <a:p>
-              <a:pPr marL="342900" indent="-342900">
-                <a:buFont typeface="+mj-lt"/>
-                <a:buAutoNum type="arabicPeriod"/>
-              </a:pPr>
-              <a:r>
-                <a:rPr lang="en-US" sz="1400" dirty="0" smtClean="0"/>
-                <a:t>Use the computer on the cart next to the PPMS.</a:t>
-              </a:r>
-            </a:p>
-            <a:p>
-              <a:pPr marL="342900" indent="-342900">
-                <a:buFont typeface="+mj-lt"/>
-                <a:buAutoNum type="arabicPeriod"/>
-              </a:pPr>
-              <a:r>
-                <a:rPr lang="en-US" sz="1400" dirty="0" smtClean="0"/>
-                <a:t>Open the program in Atom or </a:t>
-              </a:r>
-              <a:r>
-                <a:rPr lang="en-US" sz="1400" dirty="0" err="1" smtClean="0"/>
-                <a:t>gvim</a:t>
-              </a:r>
-              <a:r>
-                <a:rPr lang="en-US" sz="1400" dirty="0" smtClean="0"/>
-                <a:t>.</a:t>
-              </a:r>
-            </a:p>
-            <a:p>
-              <a:pPr marL="342900" indent="-342900">
-                <a:buFont typeface="+mj-lt"/>
-                <a:buAutoNum type="arabicPeriod"/>
-              </a:pPr>
-              <a:r>
-                <a:rPr lang="en-US" sz="1400" dirty="0" smtClean="0"/>
-                <a:t>Edit at the bottom, starting at the “#Start editing” line.</a:t>
-              </a:r>
-            </a:p>
-            <a:p>
-              <a:pPr marL="342900" indent="-342900">
-                <a:buFont typeface="+mj-lt"/>
-                <a:buAutoNum type="arabicPeriod"/>
-              </a:pPr>
-              <a:r>
-                <a:rPr lang="en-US" sz="1400" dirty="0" smtClean="0"/>
-                <a:t>Set all the parameters to the correct value for your measurement, down to the “#Stop editing” line.</a:t>
-              </a:r>
-            </a:p>
-            <a:p>
-              <a:pPr marL="342900" indent="-342900">
-                <a:buFont typeface="+mj-lt"/>
-                <a:buAutoNum type="arabicPeriod"/>
-              </a:pPr>
-              <a:endParaRPr lang="en-US" sz="1400" dirty="0" smtClean="0"/>
-            </a:p>
-          </p:txBody>
-        </p:sp>
-        <p:sp>
-          <p:nvSpPr>
-            <p:cNvPr id="21" name="Rectangle 20"/>
-            <p:cNvSpPr/>
-            <p:nvPr/>
-          </p:nvSpPr>
-          <p:spPr>
-            <a:xfrm>
-              <a:off x="5505325" y="120056"/>
-              <a:ext cx="3628463" cy="5413969"/>
-            </a:xfrm>
-            <a:prstGeom prst="rect">
-              <a:avLst/>
-            </a:prstGeom>
-            <a:noFill/>
-            <a:ln w="19050">
-              <a:solidFill>
-                <a:schemeClr val="tx1"/>
-              </a:solidFill>
-            </a:ln>
-          </p:spPr>
-          <p:style>
-            <a:lnRef idx="2">
-              <a:schemeClr val="accent1">
-                <a:shade val="50000"/>
-              </a:schemeClr>
-            </a:lnRef>
-            <a:fillRef idx="1">
-              <a:schemeClr val="accent1"/>
-            </a:fillRef>
-            <a:effectRef idx="0">
-              <a:schemeClr val="accent1"/>
-            </a:effectRef>
-            <a:fontRef idx="minor">
-              <a:schemeClr val="lt1"/>
-            </a:fontRef>
-          </p:style>
-          <p:txBody>
-            <a:bodyPr rtlCol="0" anchor="ctr"/>
-            <a:lstStyle/>
-            <a:p>
-              <a:pPr algn="ctr"/>
-              <a:endParaRPr lang="en-US"/>
-            </a:p>
-          </p:txBody>
-        </p:sp>
+        </p:pic>
         <p:grpSp>
           <p:nvGrpSpPr>
-            <p:cNvPr id="29" name="Group 28"/>
+            <p:cNvPr id="30" name="Group 29"/>
             <p:cNvGrpSpPr/>
             <p:nvPr/>
           </p:nvGrpSpPr>
           <p:grpSpPr>
             <a:xfrm>
-              <a:off x="5588163" y="2247319"/>
-              <a:ext cx="3628473" cy="3192099"/>
-              <a:chOff x="5588163" y="2247319"/>
-              <a:chExt cx="3628473" cy="3192099"/>
+              <a:off x="5488378" y="832890"/>
+              <a:ext cx="3711311" cy="5411262"/>
+              <a:chOff x="5505325" y="120056"/>
+              <a:chExt cx="3711311" cy="5411262"/>
             </a:xfrm>
           </p:grpSpPr>
-          <p:pic>
-            <p:nvPicPr>
-              <p:cNvPr id="20" name="Picture 19"/>
-              <p:cNvPicPr>
-                <a:picLocks noChangeAspect="1"/>
-              </p:cNvPicPr>
+          <p:sp>
+            <p:nvSpPr>
+              <p:cNvPr id="19" name="TextBox 18"/>
+              <p:cNvSpPr txBox="1"/>
               <p:nvPr/>
-            </p:nvPicPr>
-            <p:blipFill>
-              <a:blip r:embed="rId5"/>
-              <a:stretch>
-                <a:fillRect/>
-              </a:stretch>
-            </p:blipFill>
+            </p:nvSpPr>
             <p:spPr>
               <a:xfrm>
-                <a:off x="5588163" y="2247319"/>
-                <a:ext cx="3462789" cy="3192099"/>
+                <a:off x="5505325" y="194678"/>
+                <a:ext cx="3628463" cy="2308324"/>
               </a:xfrm>
               <a:prstGeom prst="rect">
                 <a:avLst/>
               </a:prstGeom>
+              <a:noFill/>
             </p:spPr>
-          </p:pic>
+            <p:txBody>
+              <a:bodyPr wrap="square" rtlCol="0">
+                <a:spAutoFit/>
+              </a:bodyPr>
+              <a:lstStyle/>
+              <a:p>
+                <a:pPr algn="ctr"/>
+                <a:r>
+                  <a:rPr lang="en-US" dirty="0" smtClean="0"/>
+                  <a:t>Set Up The program</a:t>
+                </a:r>
+              </a:p>
+              <a:p>
+                <a:pPr marL="342900" indent="-342900">
+                  <a:buFont typeface="+mj-lt"/>
+                  <a:buAutoNum type="arabicPeriod"/>
+                </a:pPr>
+                <a:r>
+                  <a:rPr lang="en-US" sz="1400" dirty="0" smtClean="0"/>
+                  <a:t>Use the computer on the cart next to the PPMS.</a:t>
+                </a:r>
+              </a:p>
+              <a:p>
+                <a:pPr marL="342900" indent="-342900">
+                  <a:buFont typeface="+mj-lt"/>
+                  <a:buAutoNum type="arabicPeriod"/>
+                </a:pPr>
+                <a:r>
+                  <a:rPr lang="en-US" sz="1400" dirty="0" smtClean="0"/>
+                  <a:t>Open the program in Atom or </a:t>
+                </a:r>
+                <a:r>
+                  <a:rPr lang="en-US" sz="1400" dirty="0" err="1" smtClean="0"/>
+                  <a:t>gvim</a:t>
+                </a:r>
+                <a:r>
+                  <a:rPr lang="en-US" sz="1400" dirty="0" smtClean="0"/>
+                  <a:t>.</a:t>
+                </a:r>
+              </a:p>
+              <a:p>
+                <a:pPr marL="342900" indent="-342900">
+                  <a:buFont typeface="+mj-lt"/>
+                  <a:buAutoNum type="arabicPeriod"/>
+                </a:pPr>
+                <a:r>
+                  <a:rPr lang="en-US" sz="1400" dirty="0" smtClean="0"/>
+                  <a:t>Edit at the bottom, starting at the “#Start editing” line.</a:t>
+                </a:r>
+              </a:p>
+              <a:p>
+                <a:pPr marL="342900" indent="-342900">
+                  <a:buFont typeface="+mj-lt"/>
+                  <a:buAutoNum type="arabicPeriod"/>
+                </a:pPr>
+                <a:r>
+                  <a:rPr lang="en-US" sz="1400" dirty="0" smtClean="0"/>
+                  <a:t>Set all the parameters to the correct value for your measurement, down to the “#Stop editing” line.</a:t>
+                </a:r>
+              </a:p>
+              <a:p>
+                <a:pPr marL="342900" indent="-342900">
+                  <a:buFont typeface="+mj-lt"/>
+                  <a:buAutoNum type="arabicPeriod"/>
+                </a:pPr>
+                <a:endParaRPr lang="en-US" sz="1400" dirty="0" smtClean="0"/>
+              </a:p>
+            </p:txBody>
+          </p:sp>
+          <p:sp>
+            <p:nvSpPr>
+              <p:cNvPr id="21" name="Rectangle 20"/>
+              <p:cNvSpPr/>
+              <p:nvPr/>
+            </p:nvSpPr>
+            <p:spPr>
+              <a:xfrm>
+                <a:off x="5505325" y="120056"/>
+                <a:ext cx="3628463" cy="5411262"/>
+              </a:xfrm>
+              <a:prstGeom prst="rect">
+                <a:avLst/>
+              </a:prstGeom>
+              <a:noFill/>
+              <a:ln w="19050">
+                <a:solidFill>
+                  <a:schemeClr val="tx1"/>
+                </a:solidFill>
+              </a:ln>
+            </p:spPr>
+            <p:style>
+              <a:lnRef idx="2">
+                <a:schemeClr val="accent1">
+                  <a:shade val="50000"/>
+                </a:schemeClr>
+              </a:lnRef>
+              <a:fillRef idx="1">
+                <a:schemeClr val="accent1"/>
+              </a:fillRef>
+              <a:effectRef idx="0">
+                <a:schemeClr val="accent1"/>
+              </a:effectRef>
+              <a:fontRef idx="minor">
+                <a:schemeClr val="lt1"/>
+              </a:fontRef>
+            </p:style>
+            <p:txBody>
+              <a:bodyPr rtlCol="0" anchor="ctr"/>
+              <a:lstStyle/>
+              <a:p>
+                <a:pPr algn="ctr"/>
+                <a:endParaRPr lang="en-US"/>
+              </a:p>
+            </p:txBody>
+          </p:sp>
           <p:sp>
             <p:nvSpPr>
               <p:cNvPr id="28" name="TextBox 27"/>
@@ -4338,7 +7051,6 @@
                 <a:rPr lang="en-US" sz="1400" dirty="0" smtClean="0"/>
                 <a:t>One measurement will be at a fixed temp and H direction, changing H magnitude.</a:t>
               </a:r>
-              <a:endParaRPr lang="en-US" sz="1400" dirty="0" smtClean="0"/>
             </a:p>
             <a:p>
               <a:pPr marL="285750" indent="-285750">

</xml_diff>